<commit_message>
Add protected type example - helpful?
</commit_message>
<xml_diff>
--- a/lectures/05_Concurrency/02_Shared_Data/Slides/02_Shared_Data.pptx
+++ b/lectures/05_Concurrency/02_Shared_Data/Slides/02_Shared_Data.pptx
@@ -5,14 +5,19 @@
     <p:sldMasterId id="2147483649" r:id="rId1"/>
   </p:sldMasterIdLst>
   <p:notesMasterIdLst>
-    <p:notesMasterId r:id="rId7"/>
+    <p:notesMasterId r:id="rId12"/>
   </p:notesMasterIdLst>
   <p:sldIdLst>
     <p:sldId id="256" r:id="rId2"/>
     <p:sldId id="259" r:id="rId3"/>
-    <p:sldId id="258" r:id="rId4"/>
-    <p:sldId id="257" r:id="rId5"/>
-    <p:sldId id="260" r:id="rId6"/>
+    <p:sldId id="261" r:id="rId4"/>
+    <p:sldId id="263" r:id="rId5"/>
+    <p:sldId id="262" r:id="rId6"/>
+    <p:sldId id="264" r:id="rId7"/>
+    <p:sldId id="265" r:id="rId8"/>
+    <p:sldId id="258" r:id="rId9"/>
+    <p:sldId id="257" r:id="rId10"/>
+    <p:sldId id="260" r:id="rId11"/>
   </p:sldIdLst>
   <p:sldSz cx="9144000" cy="6858000" type="screen4x3"/>
   <p:notesSz cx="6858000" cy="9144000"/>
@@ -201,7 +206,7 @@
           <a:p>
             <a:fld id="{6AEF8CB0-33D2-4F49-9A97-DB788DFC7082}" type="datetimeFigureOut">
               <a:rPr lang="en-GB" smtClean="0"/>
-              <a:t>18/03/2015</a:t>
+              <a:t>29/09/2015</a:t>
             </a:fld>
             <a:endParaRPr lang="en-GB"/>
           </a:p>
@@ -523,13 +528,7 @@
               <a:rPr lang="en-GB" altLang="en-US" baseline="0" dirty="0" smtClean="0">
                 <a:ea typeface="ＭＳ Ｐゴシック" panose="020B0600070205080204" pitchFamily="34" charset="-128"/>
               </a:rPr>
-              <a:t> </a:t>
-            </a:r>
-            <a:r>
-              <a:rPr lang="en-GB" altLang="en-US" baseline="0" dirty="0" smtClean="0">
-                <a:ea typeface="ＭＳ Ｐゴシック" panose="020B0600070205080204" pitchFamily="34" charset="-128"/>
-              </a:rPr>
-              <a:t>use of Shared </a:t>
+              <a:t> use of Shared </a:t>
             </a:r>
             <a:r>
               <a:rPr lang="en-GB" altLang="en-US" baseline="0" smtClean="0">
@@ -710,7 +709,7 @@
           <a:p>
             <a:fld id="{CA0C9329-88FA-4F10-ACFF-58B750973BE9}" type="slidenum">
               <a:rPr lang="en-GB" smtClean="0"/>
-              <a:t>3</a:t>
+              <a:t>8</a:t>
             </a:fld>
             <a:endParaRPr lang="en-GB"/>
           </a:p>
@@ -852,7 +851,7 @@
           <a:p>
             <a:fld id="{CA0C9329-88FA-4F10-ACFF-58B750973BE9}" type="slidenum">
               <a:rPr lang="en-GB" smtClean="0"/>
-              <a:t>4</a:t>
+              <a:t>9</a:t>
             </a:fld>
             <a:endParaRPr lang="en-GB"/>
           </a:p>
@@ -944,7 +943,7 @@
           <a:p>
             <a:fld id="{CA0C9329-88FA-4F10-ACFF-58B750973BE9}" type="slidenum">
               <a:rPr lang="en-GB" smtClean="0"/>
-              <a:t>5</a:t>
+              <a:t>10</a:t>
             </a:fld>
             <a:endParaRPr lang="en-GB"/>
           </a:p>
@@ -6352,11 +6351,7 @@
           <a:p>
             <a:r>
               <a:rPr lang="en-GB" dirty="0" smtClean="0"/>
-              <a:t>Concurrency in Ada – </a:t>
-            </a:r>
-            <a:r>
-              <a:rPr lang="en-GB" dirty="0" smtClean="0"/>
-              <a:t>Shared Data</a:t>
+              <a:t>Concurrency in Ada – Shared Data</a:t>
             </a:r>
             <a:endParaRPr lang="en-GB" dirty="0"/>
           </a:p>
@@ -6423,6 +6418,36 @@
     <a:masterClrMapping/>
   </p:clrMapOvr>
   <p:transition spd="slow"/>
+</p:sld>
+</file>
+
+<file path=ppt/slides/slide10.xml><?xml version="1.0" encoding="utf-8"?>
+<p:sld xmlns:a="http://schemas.openxmlformats.org/drawingml/2006/main" xmlns:r="http://schemas.openxmlformats.org/officeDocument/2006/relationships" xmlns:p="http://schemas.openxmlformats.org/presentationml/2006/main">
+  <p:cSld>
+    <p:spTree>
+      <p:nvGrpSpPr>
+        <p:cNvPr id="1" name=""/>
+        <p:cNvGrpSpPr/>
+        <p:nvPr/>
+      </p:nvGrpSpPr>
+      <p:grpSpPr>
+        <a:xfrm>
+          <a:off x="0" y="0"/>
+          <a:ext cx="0" cy="0"/>
+          <a:chOff x="0" y="0"/>
+          <a:chExt cx="0" cy="0"/>
+        </a:xfrm>
+      </p:grpSpPr>
+    </p:spTree>
+    <p:extLst>
+      <p:ext uri="{BB962C8B-B14F-4D97-AF65-F5344CB8AC3E}">
+        <p14:creationId xmlns:p14="http://schemas.microsoft.com/office/powerpoint/2010/main" val="3343519894"/>
+      </p:ext>
+    </p:extLst>
+  </p:cSld>
+  <p:clrMapOvr>
+    <a:masterClrMapping/>
+  </p:clrMapOvr>
 </p:sld>
 </file>
 
@@ -6458,7 +6483,11 @@
           <a:bodyPr/>
           <a:lstStyle/>
           <a:p>
-            <a:endParaRPr lang="en-GB"/>
+            <a:r>
+              <a:rPr lang="en-GB" dirty="0" smtClean="0"/>
+              <a:t>Passive Data Sharing Entities</a:t>
+            </a:r>
+            <a:endParaRPr lang="en-GB" dirty="0"/>
           </a:p>
         </p:txBody>
       </p:sp>
@@ -6477,7 +6506,14 @@
           <a:bodyPr/>
           <a:lstStyle/>
           <a:p>
-            <a:endParaRPr lang="en-GB"/>
+            <a:r>
+              <a:rPr lang="en-GB" dirty="0" smtClean="0"/>
+              <a:t>Protected types</a:t>
+            </a:r>
+          </a:p>
+          <a:p>
+            <a:pPr lvl="1"/>
+            <a:endParaRPr lang="en-GB" dirty="0"/>
           </a:p>
         </p:txBody>
       </p:sp>
@@ -6511,10 +6547,94 @@
           <a:chExt cx="0" cy="0"/>
         </a:xfrm>
       </p:grpSpPr>
+      <p:sp>
+        <p:nvSpPr>
+          <p:cNvPr id="3" name="Title 2"/>
+          <p:cNvSpPr>
+            <a:spLocks noGrp="1"/>
+          </p:cNvSpPr>
+          <p:nvPr>
+            <p:ph type="title"/>
+          </p:nvPr>
+        </p:nvSpPr>
+        <p:spPr/>
+        <p:txBody>
+          <a:bodyPr/>
+          <a:lstStyle/>
+          <a:p>
+            <a:r>
+              <a:rPr lang="en-GB" dirty="0"/>
+              <a:t>Active </a:t>
+            </a:r>
+            <a:r>
+              <a:rPr lang="en-GB" dirty="0" smtClean="0"/>
+              <a:t>Versus Passive Data Sharing</a:t>
+            </a:r>
+            <a:endParaRPr lang="en-GB" dirty="0"/>
+          </a:p>
+        </p:txBody>
+      </p:sp>
+      <p:sp>
+        <p:nvSpPr>
+          <p:cNvPr id="4" name="Content Placeholder 3"/>
+          <p:cNvSpPr>
+            <a:spLocks noGrp="1"/>
+          </p:cNvSpPr>
+          <p:nvPr>
+            <p:ph sz="half" idx="10"/>
+          </p:nvPr>
+        </p:nvSpPr>
+        <p:spPr/>
+        <p:txBody>
+          <a:bodyPr/>
+          <a:lstStyle/>
+          <a:p>
+            <a:r>
+              <a:rPr lang="en-GB" dirty="0" smtClean="0"/>
+              <a:t>Disadvantages </a:t>
+            </a:r>
+          </a:p>
+          <a:p>
+            <a:r>
+              <a:rPr lang="en-GB" dirty="0" smtClean="0"/>
+              <a:t>Advantages over active sharing</a:t>
+            </a:r>
+          </a:p>
+          <a:p>
+            <a:pPr lvl="1"/>
+            <a:r>
+              <a:rPr lang="en-GB" dirty="0" smtClean="0"/>
+              <a:t>Simplicity of task code</a:t>
+            </a:r>
+          </a:p>
+          <a:p>
+            <a:pPr lvl="1"/>
+            <a:r>
+              <a:rPr lang="en-GB" dirty="0" smtClean="0"/>
+              <a:t>Centralizes data management</a:t>
+            </a:r>
+          </a:p>
+          <a:p>
+            <a:pPr lvl="1"/>
+            <a:r>
+              <a:rPr lang="en-GB" dirty="0" smtClean="0"/>
+              <a:t> </a:t>
+            </a:r>
+          </a:p>
+          <a:p>
+            <a:pPr lvl="1"/>
+            <a:endParaRPr lang="en-GB" dirty="0" smtClean="0"/>
+          </a:p>
+          <a:p>
+            <a:pPr lvl="1"/>
+            <a:endParaRPr lang="en-GB" dirty="0"/>
+          </a:p>
+        </p:txBody>
+      </p:sp>
     </p:spTree>
     <p:extLst>
       <p:ext uri="{BB962C8B-B14F-4D97-AF65-F5344CB8AC3E}">
-        <p14:creationId xmlns:p14="http://schemas.microsoft.com/office/powerpoint/2010/main" val="396922585"/>
+        <p14:creationId xmlns:p14="http://schemas.microsoft.com/office/powerpoint/2010/main" val="4103535556"/>
       </p:ext>
     </p:extLst>
   </p:cSld>
@@ -6541,10 +6661,1335 @@
           <a:chExt cx="0" cy="0"/>
         </a:xfrm>
       </p:grpSpPr>
+      <p:sp>
+        <p:nvSpPr>
+          <p:cNvPr id="2" name="Title 1"/>
+          <p:cNvSpPr>
+            <a:spLocks noGrp="1"/>
+          </p:cNvSpPr>
+          <p:nvPr>
+            <p:ph type="title"/>
+          </p:nvPr>
+        </p:nvSpPr>
+        <p:spPr/>
+        <p:txBody>
+          <a:bodyPr/>
+          <a:lstStyle/>
+          <a:p>
+            <a:r>
+              <a:rPr lang="en-US" b="1" dirty="0" smtClean="0"/>
+              <a:t>Calculating </a:t>
+            </a:r>
+            <a:r>
+              <a:rPr lang="el-GR" b="1" dirty="0" smtClean="0"/>
+              <a:t>π</a:t>
+            </a:r>
+            <a:r>
+              <a:rPr lang="en-US" b="1" dirty="0" smtClean="0"/>
+              <a:t> Using Shared Data</a:t>
+            </a:r>
+            <a:endParaRPr lang="en-US" b="1" dirty="0"/>
+          </a:p>
+        </p:txBody>
+      </p:sp>
+      <p:sp>
+        <p:nvSpPr>
+          <p:cNvPr id="3" name="Content Placeholder 2"/>
+          <p:cNvSpPr>
+            <a:spLocks noGrp="1"/>
+          </p:cNvSpPr>
+          <p:nvPr>
+            <p:ph sz="half" idx="10"/>
+          </p:nvPr>
+        </p:nvSpPr>
+        <p:spPr>
+          <a:xfrm>
+            <a:off x="685800" y="1143000"/>
+            <a:ext cx="7848600" cy="654538"/>
+          </a:xfrm>
+        </p:spPr>
+        <p:txBody>
+          <a:bodyPr/>
+          <a:lstStyle/>
+          <a:p>
+            <a:r>
+              <a:rPr lang="en-US" dirty="0" smtClean="0"/>
+              <a:t>This is the main of a program that calculates the</a:t>
+            </a:r>
+            <a:endParaRPr lang="en-US" dirty="0"/>
+          </a:p>
+        </p:txBody>
+      </p:sp>
+      <p:graphicFrame>
+        <p:nvGraphicFramePr>
+          <p:cNvPr id="4" name="Tableau 5"/>
+          <p:cNvGraphicFramePr>
+            <a:graphicFrameLocks noGrp="1"/>
+          </p:cNvGraphicFramePr>
+          <p:nvPr>
+            <p:extLst>
+              <p:ext uri="{D42A27DB-BD31-4B8C-83A1-F6EECF244321}">
+                <p14:modId xmlns:p14="http://schemas.microsoft.com/office/powerpoint/2010/main" val="566136442"/>
+              </p:ext>
+            </p:extLst>
+          </p:nvPr>
+        </p:nvGraphicFramePr>
+        <p:xfrm>
+          <a:off x="862666" y="1739521"/>
+          <a:ext cx="7293625" cy="4785086"/>
+        </p:xfrm>
+        <a:graphic>
+          <a:graphicData uri="http://schemas.openxmlformats.org/drawingml/2006/table">
+            <a:tbl>
+              <a:tblPr firstRow="1" bandRow="1">
+                <a:tableStyleId>{5C22544A-7EE6-4342-B048-85BDC9FD1C3A}</a:tableStyleId>
+              </a:tblPr>
+              <a:tblGrid>
+                <a:gridCol w="7293625"/>
+              </a:tblGrid>
+              <a:tr h="2913239">
+                <a:tc>
+                  <a:txBody>
+                    <a:bodyPr/>
+                    <a:lstStyle/>
+                    <a:p>
+                      <a:r>
+                        <a:rPr lang="en-US" sz="1100" b="1" dirty="0" smtClean="0">
+                          <a:solidFill>
+                            <a:schemeClr val="tx1"/>
+                          </a:solidFill>
+                          <a:latin typeface="Courier New" pitchFamily="49" charset="0"/>
+                        </a:rPr>
+                        <a:t>with</a:t>
+                      </a:r>
+                      <a:r>
+                        <a:rPr lang="en-US" sz="1100" b="0" dirty="0" smtClean="0">
+                          <a:solidFill>
+                            <a:schemeClr val="tx1"/>
+                          </a:solidFill>
+                          <a:latin typeface="Courier New" pitchFamily="49" charset="0"/>
+                        </a:rPr>
+                        <a:t> </a:t>
+                      </a:r>
+                      <a:r>
+                        <a:rPr lang="en-US" sz="1100" b="0" dirty="0" err="1" smtClean="0">
+                          <a:solidFill>
+                            <a:schemeClr val="tx1"/>
+                          </a:solidFill>
+                          <a:latin typeface="Courier New" pitchFamily="49" charset="0"/>
+                        </a:rPr>
+                        <a:t>Ada.Text_IO</a:t>
+                      </a:r>
+                      <a:r>
+                        <a:rPr lang="en-US" sz="1100" b="0" dirty="0" smtClean="0">
+                          <a:solidFill>
+                            <a:schemeClr val="tx1"/>
+                          </a:solidFill>
+                          <a:latin typeface="Courier New" pitchFamily="49" charset="0"/>
+                        </a:rPr>
+                        <a:t>; </a:t>
+                      </a:r>
+                      <a:r>
+                        <a:rPr lang="en-US" sz="1100" b="1" dirty="0" smtClean="0">
+                          <a:solidFill>
+                            <a:schemeClr val="tx1"/>
+                          </a:solidFill>
+                          <a:latin typeface="Courier New" pitchFamily="49" charset="0"/>
+                        </a:rPr>
+                        <a:t>use</a:t>
+                      </a:r>
+                      <a:r>
+                        <a:rPr lang="en-US" sz="1100" b="0" dirty="0" smtClean="0">
+                          <a:solidFill>
+                            <a:schemeClr val="tx1"/>
+                          </a:solidFill>
+                          <a:latin typeface="Courier New" pitchFamily="49" charset="0"/>
+                        </a:rPr>
+                        <a:t> </a:t>
+                      </a:r>
+                      <a:r>
+                        <a:rPr lang="en-US" sz="1100" b="0" dirty="0" err="1" smtClean="0">
+                          <a:solidFill>
+                            <a:schemeClr val="tx1"/>
+                          </a:solidFill>
+                          <a:latin typeface="Courier New" pitchFamily="49" charset="0"/>
+                        </a:rPr>
+                        <a:t>Ada.Text_IO</a:t>
+                      </a:r>
+                      <a:r>
+                        <a:rPr lang="en-US" sz="1100" b="0" dirty="0" smtClean="0">
+                          <a:solidFill>
+                            <a:schemeClr val="tx1"/>
+                          </a:solidFill>
+                          <a:latin typeface="Courier New" pitchFamily="49" charset="0"/>
+                        </a:rPr>
+                        <a:t>;</a:t>
+                      </a:r>
+                    </a:p>
+                    <a:p>
+                      <a:r>
+                        <a:rPr lang="en-US" sz="1100" b="1" dirty="0" smtClean="0">
+                          <a:solidFill>
+                            <a:schemeClr val="tx1"/>
+                          </a:solidFill>
+                          <a:latin typeface="Courier New" pitchFamily="49" charset="0"/>
+                        </a:rPr>
+                        <a:t>with</a:t>
+                      </a:r>
+                      <a:r>
+                        <a:rPr lang="en-US" sz="1100" b="0" dirty="0" smtClean="0">
+                          <a:solidFill>
+                            <a:schemeClr val="tx1"/>
+                          </a:solidFill>
+                          <a:latin typeface="Courier New" pitchFamily="49" charset="0"/>
+                        </a:rPr>
+                        <a:t> </a:t>
+                      </a:r>
+                      <a:r>
+                        <a:rPr lang="en-US" sz="1100" b="0" dirty="0" err="1" smtClean="0">
+                          <a:solidFill>
+                            <a:schemeClr val="tx1"/>
+                          </a:solidFill>
+                          <a:latin typeface="Courier New" pitchFamily="49" charset="0"/>
+                        </a:rPr>
+                        <a:t>Ada.Calendar</a:t>
+                      </a:r>
+                      <a:r>
+                        <a:rPr lang="en-US" sz="1100" b="0" dirty="0" smtClean="0">
+                          <a:solidFill>
+                            <a:schemeClr val="tx1"/>
+                          </a:solidFill>
+                          <a:latin typeface="Courier New" pitchFamily="49" charset="0"/>
+                        </a:rPr>
+                        <a:t>; </a:t>
+                      </a:r>
+                      <a:r>
+                        <a:rPr lang="en-US" sz="1100" b="1" dirty="0" smtClean="0">
+                          <a:solidFill>
+                            <a:schemeClr val="tx1"/>
+                          </a:solidFill>
+                          <a:latin typeface="Courier New" pitchFamily="49" charset="0"/>
+                        </a:rPr>
+                        <a:t>use</a:t>
+                      </a:r>
+                      <a:r>
+                        <a:rPr lang="en-US" sz="1100" b="0" dirty="0" smtClean="0">
+                          <a:solidFill>
+                            <a:schemeClr val="tx1"/>
+                          </a:solidFill>
+                          <a:latin typeface="Courier New" pitchFamily="49" charset="0"/>
+                        </a:rPr>
+                        <a:t> </a:t>
+                      </a:r>
+                      <a:r>
+                        <a:rPr lang="en-US" sz="1100" b="0" dirty="0" err="1" smtClean="0">
+                          <a:solidFill>
+                            <a:schemeClr val="tx1"/>
+                          </a:solidFill>
+                          <a:latin typeface="Courier New" pitchFamily="49" charset="0"/>
+                        </a:rPr>
+                        <a:t>Ada.Calendar</a:t>
+                      </a:r>
+                      <a:r>
+                        <a:rPr lang="en-US" sz="1100" b="0" dirty="0" smtClean="0">
+                          <a:solidFill>
+                            <a:schemeClr val="tx1"/>
+                          </a:solidFill>
+                          <a:latin typeface="Courier New" pitchFamily="49" charset="0"/>
+                        </a:rPr>
+                        <a:t>;</a:t>
+                      </a:r>
+                    </a:p>
+                    <a:p>
+                      <a:r>
+                        <a:rPr lang="en-US" sz="1100" b="1" dirty="0" smtClean="0">
+                          <a:solidFill>
+                            <a:schemeClr val="tx1"/>
+                          </a:solidFill>
+                          <a:latin typeface="Courier New" pitchFamily="49" charset="0"/>
+                        </a:rPr>
+                        <a:t>with</a:t>
+                      </a:r>
+                      <a:r>
+                        <a:rPr lang="en-US" sz="1100" b="0" dirty="0" smtClean="0">
+                          <a:solidFill>
+                            <a:schemeClr val="tx1"/>
+                          </a:solidFill>
+                          <a:latin typeface="Courier New" pitchFamily="49" charset="0"/>
+                        </a:rPr>
+                        <a:t> </a:t>
+                      </a:r>
+                      <a:r>
+                        <a:rPr lang="en-US" sz="1100" b="0" dirty="0" err="1" smtClean="0">
+                          <a:solidFill>
+                            <a:schemeClr val="tx1"/>
+                          </a:solidFill>
+                          <a:latin typeface="Courier New" pitchFamily="49" charset="0"/>
+                        </a:rPr>
+                        <a:t>System.Multiprocessors</a:t>
+                      </a:r>
+                      <a:r>
+                        <a:rPr lang="en-US" sz="1100" b="0" dirty="0" smtClean="0">
+                          <a:solidFill>
+                            <a:schemeClr val="tx1"/>
+                          </a:solidFill>
+                          <a:latin typeface="Courier New" pitchFamily="49" charset="0"/>
+                        </a:rPr>
+                        <a:t>; </a:t>
+                      </a:r>
+                      <a:r>
+                        <a:rPr lang="en-US" sz="1100" b="1" dirty="0" smtClean="0">
+                          <a:solidFill>
+                            <a:schemeClr val="tx1"/>
+                          </a:solidFill>
+                          <a:latin typeface="Courier New" pitchFamily="49" charset="0"/>
+                        </a:rPr>
+                        <a:t>use</a:t>
+                      </a:r>
+                      <a:r>
+                        <a:rPr lang="en-US" sz="1100" b="0" dirty="0" smtClean="0">
+                          <a:solidFill>
+                            <a:schemeClr val="tx1"/>
+                          </a:solidFill>
+                          <a:latin typeface="Courier New" pitchFamily="49" charset="0"/>
+                        </a:rPr>
+                        <a:t> </a:t>
+                      </a:r>
+                      <a:r>
+                        <a:rPr lang="en-US" sz="1100" b="0" dirty="0" err="1" smtClean="0">
+                          <a:solidFill>
+                            <a:schemeClr val="tx1"/>
+                          </a:solidFill>
+                          <a:latin typeface="Courier New" pitchFamily="49" charset="0"/>
+                        </a:rPr>
+                        <a:t>System.Multiprocessors</a:t>
+                      </a:r>
+                      <a:r>
+                        <a:rPr lang="en-US" sz="1100" b="0" dirty="0" smtClean="0">
+                          <a:solidFill>
+                            <a:schemeClr val="tx1"/>
+                          </a:solidFill>
+                          <a:latin typeface="Courier New" pitchFamily="49" charset="0"/>
+                        </a:rPr>
+                        <a:t>;</a:t>
+                      </a:r>
+                    </a:p>
+                    <a:p>
+                      <a:endParaRPr lang="en-US" sz="1100" b="0" dirty="0" smtClean="0">
+                        <a:solidFill>
+                          <a:schemeClr val="tx1"/>
+                        </a:solidFill>
+                        <a:latin typeface="Courier New" pitchFamily="49" charset="0"/>
+                      </a:endParaRPr>
+                    </a:p>
+                    <a:p>
+                      <a:r>
+                        <a:rPr lang="en-US" sz="1100" b="1" dirty="0" smtClean="0">
+                          <a:solidFill>
+                            <a:schemeClr val="tx1"/>
+                          </a:solidFill>
+                          <a:latin typeface="Courier New" pitchFamily="49" charset="0"/>
+                        </a:rPr>
+                        <a:t>procedure</a:t>
+                      </a:r>
+                      <a:r>
+                        <a:rPr lang="en-US" sz="1100" b="0" dirty="0" smtClean="0">
+                          <a:solidFill>
+                            <a:schemeClr val="tx1"/>
+                          </a:solidFill>
+                          <a:latin typeface="Courier New" pitchFamily="49" charset="0"/>
+                        </a:rPr>
+                        <a:t> </a:t>
+                      </a:r>
+                      <a:r>
+                        <a:rPr lang="en-US" sz="1100" b="0" dirty="0" err="1" smtClean="0">
+                          <a:solidFill>
+                            <a:schemeClr val="tx1"/>
+                          </a:solidFill>
+                          <a:latin typeface="Courier New" pitchFamily="49" charset="0"/>
+                        </a:rPr>
+                        <a:t>Time_PI</a:t>
+                      </a:r>
+                      <a:r>
+                        <a:rPr lang="en-US" sz="1100" b="0" dirty="0" smtClean="0">
+                          <a:solidFill>
+                            <a:schemeClr val="tx1"/>
+                          </a:solidFill>
+                          <a:latin typeface="Courier New" pitchFamily="49" charset="0"/>
+                        </a:rPr>
+                        <a:t> </a:t>
+                      </a:r>
+                      <a:r>
+                        <a:rPr lang="en-US" sz="1100" b="1" dirty="0" smtClean="0">
+                          <a:solidFill>
+                            <a:schemeClr val="tx1"/>
+                          </a:solidFill>
+                          <a:latin typeface="Courier New" pitchFamily="49" charset="0"/>
+                        </a:rPr>
+                        <a:t>is</a:t>
+                      </a:r>
+                      <a:endParaRPr lang="en-US" sz="1100" b="0" dirty="0" smtClean="0">
+                        <a:solidFill>
+                          <a:schemeClr val="tx1"/>
+                        </a:solidFill>
+                        <a:latin typeface="Courier New" pitchFamily="49" charset="0"/>
+                      </a:endParaRPr>
+                    </a:p>
+                    <a:p>
+                      <a:r>
+                        <a:rPr lang="en-US" sz="1100" b="0" dirty="0" smtClean="0">
+                          <a:solidFill>
+                            <a:schemeClr val="tx1"/>
+                          </a:solidFill>
+                          <a:latin typeface="Courier New" pitchFamily="49" charset="0"/>
+                        </a:rPr>
+                        <a:t>   INTERVALS : </a:t>
+                      </a:r>
+                      <a:r>
+                        <a:rPr lang="en-US" sz="1100" b="1" dirty="0" smtClean="0">
+                          <a:solidFill>
+                            <a:schemeClr val="tx1"/>
+                          </a:solidFill>
+                          <a:latin typeface="Courier New" pitchFamily="49" charset="0"/>
+                        </a:rPr>
+                        <a:t>constant</a:t>
+                      </a:r>
+                      <a:r>
+                        <a:rPr lang="en-US" sz="1100" b="0" dirty="0" smtClean="0">
+                          <a:solidFill>
+                            <a:schemeClr val="tx1"/>
+                          </a:solidFill>
+                          <a:latin typeface="Courier New" pitchFamily="49" charset="0"/>
+                        </a:rPr>
+                        <a:t> Positive := 10_000_000; </a:t>
+                      </a:r>
+                      <a:r>
+                        <a:rPr lang="en-US" sz="1100" b="0" i="1" dirty="0" smtClean="0">
+                          <a:solidFill>
+                            <a:schemeClr val="tx1"/>
+                          </a:solidFill>
+                          <a:latin typeface="Courier New" pitchFamily="49" charset="0"/>
+                        </a:rPr>
+                        <a:t>-- Number of intervals</a:t>
+                      </a:r>
+                    </a:p>
+                    <a:p>
+                      <a:r>
+                        <a:rPr lang="en-US" sz="1100" b="0" i="1" dirty="0" smtClean="0">
+                          <a:solidFill>
+                            <a:schemeClr val="tx1"/>
+                          </a:solidFill>
+                          <a:latin typeface="Courier New" pitchFamily="49" charset="0"/>
+                        </a:rPr>
+                        <a:t>   …</a:t>
+                      </a:r>
+                      <a:r>
+                        <a:rPr lang="en-US" sz="1100" b="0" i="1" baseline="0" dirty="0" smtClean="0">
+                          <a:solidFill>
+                            <a:schemeClr val="tx1"/>
+                          </a:solidFill>
+                          <a:latin typeface="Courier New" pitchFamily="49" charset="0"/>
+                        </a:rPr>
+                        <a:t> -- The following slides will cover this section</a:t>
+                      </a:r>
+                      <a:endParaRPr lang="en-US" sz="1100" b="0" i="1" dirty="0" smtClean="0">
+                        <a:solidFill>
+                          <a:schemeClr val="tx1"/>
+                        </a:solidFill>
+                        <a:latin typeface="Courier New" pitchFamily="49" charset="0"/>
+                      </a:endParaRPr>
+                    </a:p>
+                    <a:p>
+                      <a:r>
+                        <a:rPr lang="en-US" sz="1100" b="0" i="0" dirty="0" smtClean="0">
+                          <a:solidFill>
+                            <a:schemeClr val="tx1"/>
+                          </a:solidFill>
+                          <a:latin typeface="Courier New" pitchFamily="49" charset="0"/>
+                        </a:rPr>
+                        <a:t>   Previous : Time;</a:t>
+                      </a:r>
+                    </a:p>
+                    <a:p>
+                      <a:r>
+                        <a:rPr lang="en-US" sz="1100" b="0" i="0" dirty="0" smtClean="0">
+                          <a:solidFill>
+                            <a:schemeClr val="tx1"/>
+                          </a:solidFill>
+                          <a:latin typeface="Courier New" pitchFamily="49" charset="0"/>
+                        </a:rPr>
+                        <a:t>   </a:t>
+                      </a:r>
+                      <a:r>
+                        <a:rPr lang="en-US" sz="1100" b="1" i="0" dirty="0" smtClean="0">
+                          <a:solidFill>
+                            <a:srgbClr val="FF0000"/>
+                          </a:solidFill>
+                          <a:latin typeface="Courier New" pitchFamily="49" charset="0"/>
+                        </a:rPr>
+                        <a:t>Sum      : </a:t>
+                      </a:r>
+                      <a:r>
+                        <a:rPr lang="en-US" sz="1100" b="1" i="0" dirty="0" err="1" smtClean="0">
+                          <a:solidFill>
+                            <a:srgbClr val="FF0000"/>
+                          </a:solidFill>
+                          <a:latin typeface="Courier New" pitchFamily="49" charset="0"/>
+                        </a:rPr>
+                        <a:t>Result_Data</a:t>
+                      </a:r>
+                      <a:r>
+                        <a:rPr lang="en-US" sz="1100" b="1" i="0" dirty="0" smtClean="0">
+                          <a:solidFill>
+                            <a:srgbClr val="FF0000"/>
+                          </a:solidFill>
+                          <a:latin typeface="Courier New" pitchFamily="49" charset="0"/>
+                        </a:rPr>
+                        <a:t>; </a:t>
+                      </a:r>
+                      <a:r>
+                        <a:rPr lang="en-US" sz="1100" b="0" i="1" dirty="0" smtClean="0">
+                          <a:solidFill>
+                            <a:schemeClr val="tx1"/>
+                          </a:solidFill>
+                          <a:latin typeface="Courier New" pitchFamily="49" charset="0"/>
+                        </a:rPr>
+                        <a:t>-- Our protected type</a:t>
+                      </a:r>
+                    </a:p>
+                    <a:p>
+                      <a:r>
+                        <a:rPr lang="en-US" sz="1100" b="1" i="0" dirty="0" smtClean="0">
+                          <a:solidFill>
+                            <a:schemeClr val="tx1"/>
+                          </a:solidFill>
+                          <a:latin typeface="Courier New" pitchFamily="49" charset="0"/>
+                        </a:rPr>
+                        <a:t>begin</a:t>
+                      </a:r>
+                      <a:r>
+                        <a:rPr lang="en-US" sz="1100" b="0" i="0" dirty="0" smtClean="0">
+                          <a:solidFill>
+                            <a:schemeClr val="tx1"/>
+                          </a:solidFill>
+                          <a:latin typeface="Courier New" pitchFamily="49" charset="0"/>
+                        </a:rPr>
+                        <a:t>   </a:t>
+                      </a:r>
+                    </a:p>
+                    <a:p>
+                      <a:r>
+                        <a:rPr lang="en-US" sz="1100" b="0" i="0" dirty="0" smtClean="0">
+                          <a:solidFill>
+                            <a:schemeClr val="tx1"/>
+                          </a:solidFill>
+                          <a:latin typeface="Courier New" pitchFamily="49" charset="0"/>
+                        </a:rPr>
+                        <a:t>   </a:t>
+                      </a:r>
+                      <a:r>
+                        <a:rPr lang="en-US" sz="1100" b="0" i="0" dirty="0" err="1" smtClean="0">
+                          <a:solidFill>
+                            <a:schemeClr val="tx1"/>
+                          </a:solidFill>
+                          <a:latin typeface="Courier New" pitchFamily="49" charset="0"/>
+                        </a:rPr>
+                        <a:t>Put_Line</a:t>
+                      </a:r>
+                      <a:r>
+                        <a:rPr lang="en-US" sz="1100" b="0" i="0" dirty="0" smtClean="0">
+                          <a:solidFill>
+                            <a:schemeClr val="tx1"/>
+                          </a:solidFill>
+                          <a:latin typeface="Courier New" pitchFamily="49" charset="0"/>
+                        </a:rPr>
+                        <a:t> ("Rectangle rule PI calculator with“</a:t>
+                      </a:r>
+                      <a:r>
+                        <a:rPr lang="en-US" sz="1100" b="0" i="0" baseline="0" dirty="0" smtClean="0">
+                          <a:solidFill>
+                            <a:schemeClr val="tx1"/>
+                          </a:solidFill>
+                          <a:latin typeface="Courier New" pitchFamily="49" charset="0"/>
+                        </a:rPr>
+                        <a:t> </a:t>
+                      </a:r>
+                      <a:r>
+                        <a:rPr lang="en-US" sz="1100" b="0" i="0" dirty="0" smtClean="0">
+                          <a:solidFill>
+                            <a:schemeClr val="tx1"/>
+                          </a:solidFill>
+                          <a:latin typeface="Courier New" pitchFamily="49" charset="0"/>
+                        </a:rPr>
+                        <a:t>&amp; </a:t>
+                      </a:r>
+                      <a:r>
+                        <a:rPr lang="en-US" sz="1100" b="0" i="0" dirty="0" err="1" smtClean="0">
+                          <a:solidFill>
+                            <a:schemeClr val="tx1"/>
+                          </a:solidFill>
+                          <a:latin typeface="Courier New" pitchFamily="49" charset="0"/>
+                        </a:rPr>
+                        <a:t>Integer'</a:t>
+                      </a:r>
+                      <a:r>
+                        <a:rPr lang="en-US" sz="1100" b="1" i="0" dirty="0" err="1" smtClean="0">
+                          <a:solidFill>
+                            <a:schemeClr val="tx1"/>
+                          </a:solidFill>
+                          <a:latin typeface="Courier New" pitchFamily="49" charset="0"/>
+                        </a:rPr>
+                        <a:t>image</a:t>
+                      </a:r>
+                      <a:r>
+                        <a:rPr lang="en-US" sz="1100" b="1" i="0" dirty="0" smtClean="0">
+                          <a:solidFill>
+                            <a:schemeClr val="tx1"/>
+                          </a:solidFill>
+                          <a:latin typeface="Courier New" pitchFamily="49" charset="0"/>
+                        </a:rPr>
+                        <a:t> </a:t>
+                      </a:r>
+                      <a:r>
+                        <a:rPr lang="en-US" sz="1100" b="0" i="0" dirty="0" smtClean="0">
+                          <a:solidFill>
+                            <a:schemeClr val="tx1"/>
+                          </a:solidFill>
+                          <a:latin typeface="Courier New" pitchFamily="49" charset="0"/>
+                        </a:rPr>
+                        <a:t>(INTERVALS));</a:t>
+                      </a:r>
+                    </a:p>
+                    <a:p>
+                      <a:r>
+                        <a:rPr lang="en-US" sz="1100" b="0" i="0" dirty="0" smtClean="0">
+                          <a:solidFill>
+                            <a:schemeClr val="tx1"/>
+                          </a:solidFill>
+                          <a:latin typeface="Courier New" pitchFamily="49" charset="0"/>
+                        </a:rPr>
+                        <a:t>   </a:t>
+                      </a:r>
+                      <a:r>
+                        <a:rPr lang="en-US" sz="1100" b="1" i="0" dirty="0" smtClean="0">
+                          <a:solidFill>
+                            <a:schemeClr val="tx1"/>
+                          </a:solidFill>
+                          <a:latin typeface="Courier New" pitchFamily="49" charset="0"/>
+                        </a:rPr>
+                        <a:t>for</a:t>
+                      </a:r>
+                      <a:r>
+                        <a:rPr lang="en-US" sz="1100" b="0" i="0" dirty="0" smtClean="0">
+                          <a:solidFill>
+                            <a:schemeClr val="tx1"/>
+                          </a:solidFill>
+                          <a:latin typeface="Courier New" pitchFamily="49" charset="0"/>
+                        </a:rPr>
+                        <a:t> I </a:t>
+                      </a:r>
+                      <a:r>
+                        <a:rPr lang="en-US" sz="1100" b="1" i="0" dirty="0" smtClean="0">
+                          <a:solidFill>
+                            <a:schemeClr val="tx1"/>
+                          </a:solidFill>
+                          <a:latin typeface="Courier New" pitchFamily="49" charset="0"/>
+                        </a:rPr>
+                        <a:t>in</a:t>
+                      </a:r>
+                      <a:r>
+                        <a:rPr lang="en-US" sz="1100" b="0" i="0" dirty="0" smtClean="0">
+                          <a:solidFill>
+                            <a:schemeClr val="tx1"/>
+                          </a:solidFill>
+                          <a:latin typeface="Courier New" pitchFamily="49" charset="0"/>
+                        </a:rPr>
+                        <a:t> 1..Number_Of_CPUs </a:t>
+                      </a:r>
+                      <a:r>
+                        <a:rPr lang="en-US" sz="1100" b="1" i="0" dirty="0" smtClean="0">
+                          <a:solidFill>
+                            <a:schemeClr val="tx1"/>
+                          </a:solidFill>
+                          <a:latin typeface="Courier New" pitchFamily="49" charset="0"/>
+                        </a:rPr>
+                        <a:t>loop</a:t>
+                      </a:r>
+                    </a:p>
+                    <a:p>
+                      <a:r>
+                        <a:rPr lang="en-US" sz="1100" b="0" i="0" dirty="0" smtClean="0">
+                          <a:solidFill>
+                            <a:schemeClr val="tx1"/>
+                          </a:solidFill>
+                          <a:latin typeface="Courier New" pitchFamily="49" charset="0"/>
+                        </a:rPr>
+                        <a:t>      </a:t>
+                      </a:r>
+                      <a:r>
+                        <a:rPr lang="en-US" sz="1100" b="0" i="0" dirty="0" err="1" smtClean="0">
+                          <a:solidFill>
+                            <a:schemeClr val="tx1"/>
+                          </a:solidFill>
+                          <a:latin typeface="Courier New" pitchFamily="49" charset="0"/>
+                        </a:rPr>
+                        <a:t>Put_Line</a:t>
+                      </a:r>
+                      <a:r>
+                        <a:rPr lang="en-US" sz="1100" b="0" i="0" dirty="0" smtClean="0">
+                          <a:solidFill>
+                            <a:schemeClr val="tx1"/>
+                          </a:solidFill>
+                          <a:latin typeface="Courier New" pitchFamily="49" charset="0"/>
+                        </a:rPr>
+                        <a:t> (</a:t>
+                      </a:r>
+                      <a:r>
+                        <a:rPr lang="en-US" sz="1100" b="0" i="0" dirty="0" err="1" smtClean="0">
+                          <a:solidFill>
+                            <a:schemeClr val="tx1"/>
+                          </a:solidFill>
+                          <a:latin typeface="Courier New" pitchFamily="49" charset="0"/>
+                        </a:rPr>
+                        <a:t>CPU_Range'</a:t>
+                      </a:r>
+                      <a:r>
+                        <a:rPr lang="en-US" sz="1100" b="1" i="0" dirty="0" err="1" smtClean="0">
+                          <a:solidFill>
+                            <a:schemeClr val="tx1"/>
+                          </a:solidFill>
+                          <a:latin typeface="Courier New" pitchFamily="49" charset="0"/>
+                        </a:rPr>
+                        <a:t>image</a:t>
+                      </a:r>
+                      <a:r>
+                        <a:rPr lang="en-US" sz="1100" b="1" i="0" dirty="0" smtClean="0">
+                          <a:solidFill>
+                            <a:schemeClr val="tx1"/>
+                          </a:solidFill>
+                          <a:latin typeface="Courier New" pitchFamily="49" charset="0"/>
+                        </a:rPr>
+                        <a:t> </a:t>
+                      </a:r>
+                      <a:r>
+                        <a:rPr lang="en-US" sz="1100" b="0" i="0" dirty="0" smtClean="0">
+                          <a:solidFill>
+                            <a:schemeClr val="tx1"/>
+                          </a:solidFill>
+                          <a:latin typeface="Courier New" pitchFamily="49" charset="0"/>
+                        </a:rPr>
+                        <a:t>(I) &amp; " CPU(s):");</a:t>
+                      </a:r>
+                    </a:p>
+                    <a:p>
+                      <a:r>
+                        <a:rPr lang="en-US" sz="1100" b="0" i="0" dirty="0" smtClean="0">
+                          <a:solidFill>
+                            <a:schemeClr val="tx1"/>
+                          </a:solidFill>
+                          <a:latin typeface="Courier New" pitchFamily="49" charset="0"/>
+                        </a:rPr>
+                        <a:t>      </a:t>
+                      </a:r>
+                      <a:r>
+                        <a:rPr lang="en-US" sz="1100" b="0" i="0" dirty="0" err="1" smtClean="0">
+                          <a:solidFill>
+                            <a:schemeClr val="tx1"/>
+                          </a:solidFill>
+                          <a:latin typeface="Courier New" pitchFamily="49" charset="0"/>
+                        </a:rPr>
+                        <a:t>Sum.Clear</a:t>
+                      </a:r>
+                      <a:r>
+                        <a:rPr lang="en-US" sz="1100" b="0" i="0" dirty="0" smtClean="0">
+                          <a:solidFill>
+                            <a:schemeClr val="tx1"/>
+                          </a:solidFill>
+                          <a:latin typeface="Courier New" pitchFamily="49" charset="0"/>
+                        </a:rPr>
+                        <a:t>;</a:t>
+                      </a:r>
+                    </a:p>
+                    <a:p>
+                      <a:r>
+                        <a:rPr lang="en-US" sz="1100" b="0" i="0" dirty="0" smtClean="0">
+                          <a:solidFill>
+                            <a:schemeClr val="tx1"/>
+                          </a:solidFill>
+                          <a:latin typeface="Courier New" pitchFamily="49" charset="0"/>
+                        </a:rPr>
+                        <a:t>      Previous := Clock;</a:t>
+                      </a:r>
+                    </a:p>
+                    <a:p>
+                      <a:r>
+                        <a:rPr lang="en-US" sz="1100" b="0" i="0" baseline="0" dirty="0" smtClean="0">
+                          <a:solidFill>
+                            <a:schemeClr val="tx1"/>
+                          </a:solidFill>
+                          <a:latin typeface="Courier New" pitchFamily="49" charset="0"/>
+                        </a:rPr>
+                        <a:t>      </a:t>
+                      </a:r>
+                      <a:r>
+                        <a:rPr lang="en-US" sz="1100" b="1" i="0" dirty="0" smtClean="0">
+                          <a:solidFill>
+                            <a:schemeClr val="tx1"/>
+                          </a:solidFill>
+                          <a:latin typeface="Courier New" pitchFamily="49" charset="0"/>
+                        </a:rPr>
+                        <a:t>declare</a:t>
+                      </a:r>
+                    </a:p>
+                    <a:p>
+                      <a:r>
+                        <a:rPr lang="en-US" sz="1100" b="0" i="0" baseline="0" dirty="0" smtClean="0">
+                          <a:solidFill>
+                            <a:schemeClr val="tx1"/>
+                          </a:solidFill>
+                          <a:latin typeface="Courier New" pitchFamily="49" charset="0"/>
+                        </a:rPr>
+                        <a:t>      </a:t>
+                      </a:r>
+                      <a:r>
+                        <a:rPr lang="en-US" sz="1100" b="0" i="0" dirty="0" smtClean="0">
+                          <a:solidFill>
+                            <a:schemeClr val="tx1"/>
+                          </a:solidFill>
+                          <a:latin typeface="Courier New" pitchFamily="49" charset="0"/>
+                        </a:rPr>
+                        <a:t>Processes : array(1..I) of </a:t>
+                      </a:r>
+                      <a:r>
+                        <a:rPr lang="en-US" sz="1100" b="0" i="0" dirty="0" err="1" smtClean="0">
+                          <a:solidFill>
+                            <a:schemeClr val="tx1"/>
+                          </a:solidFill>
+                          <a:latin typeface="Courier New" pitchFamily="49" charset="0"/>
+                        </a:rPr>
+                        <a:t>PI_Process</a:t>
+                      </a:r>
+                      <a:r>
+                        <a:rPr lang="en-US" sz="1100" b="0" i="0" dirty="0" smtClean="0">
+                          <a:solidFill>
+                            <a:schemeClr val="tx1"/>
+                          </a:solidFill>
+                          <a:latin typeface="Courier New" pitchFamily="49" charset="0"/>
+                        </a:rPr>
+                        <a:t>; </a:t>
+                      </a:r>
+                      <a:r>
+                        <a:rPr lang="en-US" sz="1100" b="0" i="1" dirty="0" smtClean="0">
+                          <a:solidFill>
+                            <a:schemeClr val="tx1"/>
+                          </a:solidFill>
+                          <a:latin typeface="Courier New" pitchFamily="49" charset="0"/>
+                        </a:rPr>
+                        <a:t>--</a:t>
+                      </a:r>
+                      <a:r>
+                        <a:rPr lang="en-US" sz="1100" b="0" i="1" baseline="0" dirty="0" smtClean="0">
+                          <a:solidFill>
+                            <a:schemeClr val="tx1"/>
+                          </a:solidFill>
+                          <a:latin typeface="Courier New" pitchFamily="49" charset="0"/>
+                        </a:rPr>
+                        <a:t> Our task </a:t>
+                      </a:r>
+                      <a:r>
+                        <a:rPr lang="en-US" sz="1100" b="0" i="1" baseline="0" dirty="0" smtClean="0">
+                          <a:solidFill>
+                            <a:schemeClr val="tx1"/>
+                          </a:solidFill>
+                          <a:latin typeface="Courier New" pitchFamily="49" charset="0"/>
+                        </a:rPr>
+                        <a:t>type which uses Sum</a:t>
+                      </a:r>
+                      <a:endParaRPr lang="en-US" sz="1100" b="0" i="0" dirty="0" smtClean="0">
+                        <a:solidFill>
+                          <a:schemeClr val="tx1"/>
+                        </a:solidFill>
+                        <a:latin typeface="Courier New" pitchFamily="49" charset="0"/>
+                      </a:endParaRPr>
+                    </a:p>
+                    <a:p>
+                      <a:r>
+                        <a:rPr lang="en-US" sz="1100" b="0" i="0" baseline="0" dirty="0" smtClean="0">
+                          <a:solidFill>
+                            <a:schemeClr val="tx1"/>
+                          </a:solidFill>
+                          <a:latin typeface="Courier New" pitchFamily="49" charset="0"/>
+                        </a:rPr>
+                        <a:t>      </a:t>
+                      </a:r>
+                      <a:r>
+                        <a:rPr lang="en-US" sz="1100" b="1" i="0" dirty="0" smtClean="0">
+                          <a:solidFill>
+                            <a:schemeClr val="tx1"/>
+                          </a:solidFill>
+                          <a:latin typeface="Courier New" pitchFamily="49" charset="0"/>
+                        </a:rPr>
+                        <a:t>begin</a:t>
+                      </a:r>
+                    </a:p>
+                    <a:p>
+                      <a:r>
+                        <a:rPr lang="en-US" sz="1100" b="0" i="0" dirty="0" smtClean="0">
+                          <a:solidFill>
+                            <a:schemeClr val="tx1"/>
+                          </a:solidFill>
+                          <a:latin typeface="Courier New" pitchFamily="49" charset="0"/>
+                        </a:rPr>
+                        <a:t>         </a:t>
+                      </a:r>
+                      <a:r>
+                        <a:rPr lang="en-US" sz="1100" b="1" i="0" dirty="0" smtClean="0">
+                          <a:solidFill>
+                            <a:schemeClr val="tx1"/>
+                          </a:solidFill>
+                          <a:latin typeface="Courier New" pitchFamily="49" charset="0"/>
+                        </a:rPr>
+                        <a:t>for</a:t>
+                      </a:r>
+                      <a:r>
+                        <a:rPr lang="en-US" sz="1100" b="0" i="0" dirty="0" smtClean="0">
+                          <a:solidFill>
+                            <a:schemeClr val="tx1"/>
+                          </a:solidFill>
+                          <a:latin typeface="Courier New" pitchFamily="49" charset="0"/>
+                        </a:rPr>
+                        <a:t> J </a:t>
+                      </a:r>
+                      <a:r>
+                        <a:rPr lang="en-US" sz="1100" b="1" i="0" dirty="0" smtClean="0">
+                          <a:solidFill>
+                            <a:schemeClr val="tx1"/>
+                          </a:solidFill>
+                          <a:latin typeface="Courier New" pitchFamily="49" charset="0"/>
+                        </a:rPr>
+                        <a:t>in</a:t>
+                      </a:r>
+                      <a:r>
+                        <a:rPr lang="en-US" sz="1100" b="0" i="0" dirty="0" smtClean="0">
+                          <a:solidFill>
+                            <a:schemeClr val="tx1"/>
+                          </a:solidFill>
+                          <a:latin typeface="Courier New" pitchFamily="49" charset="0"/>
+                        </a:rPr>
+                        <a:t> </a:t>
+                      </a:r>
+                      <a:r>
+                        <a:rPr lang="en-US" sz="1100" b="0" i="0" dirty="0" err="1" smtClean="0">
+                          <a:solidFill>
+                            <a:schemeClr val="tx1"/>
+                          </a:solidFill>
+                          <a:latin typeface="Courier New" pitchFamily="49" charset="0"/>
+                        </a:rPr>
+                        <a:t>Processes'range</a:t>
+                      </a:r>
+                      <a:r>
+                        <a:rPr lang="en-US" sz="1100" b="0" i="0" dirty="0" smtClean="0">
+                          <a:solidFill>
+                            <a:schemeClr val="tx1"/>
+                          </a:solidFill>
+                          <a:latin typeface="Courier New" pitchFamily="49" charset="0"/>
+                        </a:rPr>
+                        <a:t> </a:t>
+                      </a:r>
+                      <a:r>
+                        <a:rPr lang="en-US" sz="1100" b="1" i="0" dirty="0" smtClean="0">
+                          <a:solidFill>
+                            <a:schemeClr val="tx1"/>
+                          </a:solidFill>
+                          <a:latin typeface="Courier New" pitchFamily="49" charset="0"/>
+                        </a:rPr>
+                        <a:t>loop</a:t>
+                      </a:r>
+                    </a:p>
+                    <a:p>
+                      <a:r>
+                        <a:rPr lang="en-US" sz="1100" b="0" i="0" dirty="0" smtClean="0">
+                          <a:solidFill>
+                            <a:schemeClr val="tx1"/>
+                          </a:solidFill>
+                          <a:latin typeface="Courier New" pitchFamily="49" charset="0"/>
+                        </a:rPr>
+                        <a:t>            Processes(J).Initialize</a:t>
+                      </a:r>
+                    </a:p>
+                    <a:p>
+                      <a:r>
+                        <a:rPr lang="en-US" sz="1100" b="0" i="0" baseline="0" dirty="0" smtClean="0">
+                          <a:solidFill>
+                            <a:schemeClr val="tx1"/>
+                          </a:solidFill>
+                          <a:latin typeface="Courier New" pitchFamily="49" charset="0"/>
+                        </a:rPr>
+                        <a:t>               </a:t>
+                      </a:r>
+                      <a:r>
+                        <a:rPr lang="en-US" sz="1100" b="0" i="0" dirty="0" smtClean="0">
+                          <a:solidFill>
+                            <a:schemeClr val="tx1"/>
+                          </a:solidFill>
+                          <a:latin typeface="Courier New" pitchFamily="49" charset="0"/>
+                        </a:rPr>
+                        <a:t>(Positive(J), INTERVALS / Positive(</a:t>
+                      </a:r>
+                      <a:r>
+                        <a:rPr lang="en-US" sz="1100" b="0" i="0" dirty="0" err="1" smtClean="0">
+                          <a:solidFill>
+                            <a:schemeClr val="tx1"/>
+                          </a:solidFill>
+                          <a:latin typeface="Courier New" pitchFamily="49" charset="0"/>
+                        </a:rPr>
+                        <a:t>Processes'last</a:t>
+                      </a:r>
+                      <a:r>
+                        <a:rPr lang="en-US" sz="1100" b="0" i="0" dirty="0" smtClean="0">
+                          <a:solidFill>
+                            <a:schemeClr val="tx1"/>
+                          </a:solidFill>
+                          <a:latin typeface="Courier New" pitchFamily="49" charset="0"/>
+                        </a:rPr>
+                        <a:t>));</a:t>
+                      </a:r>
+                    </a:p>
+                    <a:p>
+                      <a:r>
+                        <a:rPr lang="en-US" sz="1100" b="0" i="0" dirty="0" smtClean="0">
+                          <a:solidFill>
+                            <a:schemeClr val="tx1"/>
+                          </a:solidFill>
+                          <a:latin typeface="Courier New" pitchFamily="49" charset="0"/>
+                        </a:rPr>
+                        <a:t>         </a:t>
+                      </a:r>
+                      <a:r>
+                        <a:rPr lang="en-US" sz="1100" b="1" i="0" dirty="0" smtClean="0">
+                          <a:solidFill>
+                            <a:schemeClr val="tx1"/>
+                          </a:solidFill>
+                          <a:latin typeface="Courier New" pitchFamily="49" charset="0"/>
+                        </a:rPr>
+                        <a:t>end loop</a:t>
+                      </a:r>
+                      <a:r>
+                        <a:rPr lang="en-US" sz="1100" b="0" i="0" dirty="0" smtClean="0">
+                          <a:solidFill>
+                            <a:schemeClr val="tx1"/>
+                          </a:solidFill>
+                          <a:latin typeface="Courier New" pitchFamily="49" charset="0"/>
+                        </a:rPr>
+                        <a:t>;</a:t>
+                      </a:r>
+                    </a:p>
+                    <a:p>
+                      <a:r>
+                        <a:rPr lang="en-US" sz="1100" b="0" i="0" dirty="0" smtClean="0">
+                          <a:solidFill>
+                            <a:schemeClr val="tx1"/>
+                          </a:solidFill>
+                          <a:latin typeface="Courier New" pitchFamily="49" charset="0"/>
+                        </a:rPr>
+                        <a:t>      </a:t>
+                      </a:r>
+                      <a:r>
+                        <a:rPr lang="en-US" sz="1100" b="1" i="0" dirty="0" smtClean="0">
+                          <a:solidFill>
+                            <a:schemeClr val="tx1"/>
+                          </a:solidFill>
+                          <a:latin typeface="Courier New" pitchFamily="49" charset="0"/>
+                        </a:rPr>
+                        <a:t>end</a:t>
+                      </a:r>
+                      <a:r>
+                        <a:rPr lang="en-US" sz="1100" b="0" i="0" dirty="0" smtClean="0">
+                          <a:solidFill>
+                            <a:schemeClr val="tx1"/>
+                          </a:solidFill>
+                          <a:latin typeface="Courier New" pitchFamily="49" charset="0"/>
+                        </a:rPr>
+                        <a:t>;</a:t>
+                      </a:r>
+                    </a:p>
+                    <a:p>
+                      <a:r>
+                        <a:rPr lang="en-US" sz="1100" b="0" i="0" dirty="0" smtClean="0">
+                          <a:solidFill>
+                            <a:schemeClr val="tx1"/>
+                          </a:solidFill>
+                          <a:latin typeface="Courier New" pitchFamily="49" charset="0"/>
+                        </a:rPr>
+                        <a:t>      </a:t>
+                      </a:r>
+                      <a:r>
+                        <a:rPr lang="en-US" sz="1100" b="0" i="0" dirty="0" err="1" smtClean="0">
+                          <a:solidFill>
+                            <a:schemeClr val="tx1"/>
+                          </a:solidFill>
+                          <a:latin typeface="Courier New" pitchFamily="49" charset="0"/>
+                        </a:rPr>
+                        <a:t>Put_Line</a:t>
+                      </a:r>
+                      <a:r>
+                        <a:rPr lang="en-US" sz="1100" b="0" i="0" dirty="0" smtClean="0">
+                          <a:solidFill>
+                            <a:schemeClr val="tx1"/>
+                          </a:solidFill>
+                          <a:latin typeface="Courier New" pitchFamily="49" charset="0"/>
+                        </a:rPr>
+                        <a:t> ("  Elapsed“</a:t>
+                      </a:r>
+                      <a:r>
+                        <a:rPr lang="en-US" sz="1100" b="0" i="0" baseline="0" dirty="0" smtClean="0">
+                          <a:solidFill>
+                            <a:schemeClr val="tx1"/>
+                          </a:solidFill>
+                          <a:latin typeface="Courier New" pitchFamily="49" charset="0"/>
+                        </a:rPr>
+                        <a:t> </a:t>
+                      </a:r>
+                      <a:r>
+                        <a:rPr lang="en-US" sz="1100" b="0" i="0" dirty="0" smtClean="0">
+                          <a:solidFill>
+                            <a:schemeClr val="tx1"/>
+                          </a:solidFill>
+                          <a:latin typeface="Courier New" pitchFamily="49" charset="0"/>
+                        </a:rPr>
+                        <a:t>&amp; </a:t>
+                      </a:r>
+                      <a:r>
+                        <a:rPr lang="en-US" sz="1100" b="0" i="0" dirty="0" err="1" smtClean="0">
+                          <a:solidFill>
+                            <a:schemeClr val="tx1"/>
+                          </a:solidFill>
+                          <a:latin typeface="Courier New" pitchFamily="49" charset="0"/>
+                        </a:rPr>
+                        <a:t>Duration'image</a:t>
+                      </a:r>
+                      <a:r>
+                        <a:rPr lang="en-US" sz="1100" b="0" i="0" dirty="0" smtClean="0">
+                          <a:solidFill>
+                            <a:schemeClr val="tx1"/>
+                          </a:solidFill>
+                          <a:latin typeface="Courier New" pitchFamily="49" charset="0"/>
+                        </a:rPr>
+                        <a:t>(Clock - Previous) &amp; " seconds");</a:t>
+                      </a:r>
+                    </a:p>
+                    <a:p>
+                      <a:r>
+                        <a:rPr lang="en-US" sz="1100" b="0" i="0" dirty="0" smtClean="0">
+                          <a:solidFill>
+                            <a:schemeClr val="tx1"/>
+                          </a:solidFill>
+                          <a:latin typeface="Courier New" pitchFamily="49" charset="0"/>
+                        </a:rPr>
+                        <a:t>      </a:t>
+                      </a:r>
+                      <a:r>
+                        <a:rPr lang="en-US" sz="1100" b="0" i="0" dirty="0" err="1" smtClean="0">
+                          <a:solidFill>
+                            <a:schemeClr val="tx1"/>
+                          </a:solidFill>
+                          <a:latin typeface="Courier New" pitchFamily="49" charset="0"/>
+                        </a:rPr>
+                        <a:t>Put_Line</a:t>
+                      </a:r>
+                      <a:r>
+                        <a:rPr lang="en-US" sz="1100" b="0" i="0" dirty="0" smtClean="0">
+                          <a:solidFill>
+                            <a:schemeClr val="tx1"/>
+                          </a:solidFill>
+                          <a:latin typeface="Courier New" pitchFamily="49" charset="0"/>
+                        </a:rPr>
+                        <a:t> ("  Result“</a:t>
+                      </a:r>
+                      <a:r>
+                        <a:rPr lang="en-US" sz="1100" b="0" i="0" baseline="0" dirty="0" smtClean="0">
+                          <a:solidFill>
+                            <a:schemeClr val="tx1"/>
+                          </a:solidFill>
+                          <a:latin typeface="Courier New" pitchFamily="49" charset="0"/>
+                        </a:rPr>
+                        <a:t>  </a:t>
+                      </a:r>
+                      <a:r>
+                        <a:rPr lang="en-US" sz="1100" b="0" i="0" dirty="0" smtClean="0">
+                          <a:solidFill>
+                            <a:schemeClr val="tx1"/>
+                          </a:solidFill>
+                          <a:latin typeface="Courier New" pitchFamily="49" charset="0"/>
+                        </a:rPr>
+                        <a:t>&amp; </a:t>
+                      </a:r>
+                      <a:r>
+                        <a:rPr lang="en-US" sz="1100" b="0" i="0" dirty="0" err="1" smtClean="0">
+                          <a:solidFill>
+                            <a:schemeClr val="tx1"/>
+                          </a:solidFill>
+                          <a:latin typeface="Courier New" pitchFamily="49" charset="0"/>
+                        </a:rPr>
+                        <a:t>Long_Long_Float'</a:t>
+                      </a:r>
+                      <a:r>
+                        <a:rPr lang="en-US" sz="1100" b="1" i="0" dirty="0" err="1" smtClean="0">
+                          <a:solidFill>
+                            <a:schemeClr val="tx1"/>
+                          </a:solidFill>
+                          <a:latin typeface="Courier New" pitchFamily="49" charset="0"/>
+                        </a:rPr>
+                        <a:t>image</a:t>
+                      </a:r>
+                      <a:endParaRPr lang="en-US" sz="1100" b="1" i="0" dirty="0" smtClean="0">
+                        <a:solidFill>
+                          <a:schemeClr val="tx1"/>
+                        </a:solidFill>
+                        <a:latin typeface="Courier New" pitchFamily="49" charset="0"/>
+                      </a:endParaRPr>
+                    </a:p>
+                    <a:p>
+                      <a:r>
+                        <a:rPr lang="en-US" sz="1100" b="1" i="0" dirty="0" smtClean="0">
+                          <a:solidFill>
+                            <a:schemeClr val="tx1"/>
+                          </a:solidFill>
+                          <a:latin typeface="Courier New" pitchFamily="49" charset="0"/>
+                        </a:rPr>
+                        <a:t>         </a:t>
+                      </a:r>
+                      <a:r>
+                        <a:rPr lang="en-US" sz="1100" b="0" i="0" dirty="0" smtClean="0">
+                          <a:solidFill>
+                            <a:schemeClr val="tx1"/>
+                          </a:solidFill>
+                          <a:latin typeface="Courier New" pitchFamily="49" charset="0"/>
+                        </a:rPr>
+                        <a:t>(</a:t>
+                      </a:r>
+                      <a:r>
+                        <a:rPr lang="en-US" sz="1100" b="1" i="0" dirty="0" err="1" smtClean="0">
+                          <a:solidFill>
+                            <a:srgbClr val="FF0000"/>
+                          </a:solidFill>
+                          <a:latin typeface="Courier New" pitchFamily="49" charset="0"/>
+                        </a:rPr>
+                        <a:t>Sum.Get</a:t>
+                      </a:r>
+                      <a:r>
+                        <a:rPr lang="en-US" sz="1100" b="0" i="0" dirty="0" smtClean="0">
+                          <a:solidFill>
+                            <a:schemeClr val="tx1"/>
+                          </a:solidFill>
+                          <a:latin typeface="Courier New" pitchFamily="49" charset="0"/>
+                        </a:rPr>
+                        <a:t> * (1.0 /</a:t>
+                      </a:r>
+                      <a:r>
+                        <a:rPr lang="en-US" sz="1100" b="0" i="0" baseline="0" dirty="0" smtClean="0">
+                          <a:solidFill>
+                            <a:schemeClr val="tx1"/>
+                          </a:solidFill>
+                          <a:latin typeface="Courier New" pitchFamily="49" charset="0"/>
+                        </a:rPr>
+                        <a:t> </a:t>
+                      </a:r>
+                      <a:r>
+                        <a:rPr lang="en-US" sz="1100" b="0" i="0" dirty="0" err="1" smtClean="0">
+                          <a:solidFill>
+                            <a:schemeClr val="tx1"/>
+                          </a:solidFill>
+                          <a:latin typeface="Courier New" pitchFamily="49" charset="0"/>
+                        </a:rPr>
+                        <a:t>Long_Long_Float</a:t>
+                      </a:r>
+                      <a:r>
+                        <a:rPr lang="en-US" sz="1100" b="0" i="0" dirty="0" smtClean="0">
+                          <a:solidFill>
+                            <a:schemeClr val="tx1"/>
+                          </a:solidFill>
+                          <a:latin typeface="Courier New" pitchFamily="49" charset="0"/>
+                        </a:rPr>
+                        <a:t>(INTERVALS))));</a:t>
+                      </a:r>
+                    </a:p>
+                    <a:p>
+                      <a:r>
+                        <a:rPr lang="en-US" sz="1100" b="1" i="0" baseline="0" dirty="0" smtClean="0">
+                          <a:solidFill>
+                            <a:schemeClr val="tx1"/>
+                          </a:solidFill>
+                          <a:latin typeface="Courier New" pitchFamily="49" charset="0"/>
+                        </a:rPr>
+                        <a:t>   </a:t>
+                      </a:r>
+                      <a:r>
+                        <a:rPr lang="en-US" sz="1100" b="1" i="0" dirty="0" smtClean="0">
+                          <a:solidFill>
+                            <a:schemeClr val="tx1"/>
+                          </a:solidFill>
+                          <a:latin typeface="Courier New" pitchFamily="49" charset="0"/>
+                        </a:rPr>
+                        <a:t>end loop</a:t>
+                      </a:r>
+                      <a:r>
+                        <a:rPr lang="en-US" sz="1100" b="0" i="0" dirty="0" smtClean="0">
+                          <a:solidFill>
+                            <a:schemeClr val="tx1"/>
+                          </a:solidFill>
+                          <a:latin typeface="Courier New" pitchFamily="49" charset="0"/>
+                        </a:rPr>
+                        <a:t>;</a:t>
+                      </a:r>
+                    </a:p>
+                    <a:p>
+                      <a:r>
+                        <a:rPr lang="en-US" sz="1100" b="1" i="0" dirty="0" smtClean="0">
+                          <a:solidFill>
+                            <a:schemeClr val="tx1"/>
+                          </a:solidFill>
+                          <a:latin typeface="Courier New" pitchFamily="49" charset="0"/>
+                        </a:rPr>
+                        <a:t>end </a:t>
+                      </a:r>
+                      <a:r>
+                        <a:rPr lang="en-US" sz="1100" b="0" i="0" dirty="0" err="1" smtClean="0">
+                          <a:solidFill>
+                            <a:schemeClr val="tx1"/>
+                          </a:solidFill>
+                          <a:latin typeface="Courier New" pitchFamily="49" charset="0"/>
+                        </a:rPr>
+                        <a:t>Time_PI</a:t>
+                      </a:r>
+                      <a:r>
+                        <a:rPr lang="en-US" sz="1100" b="0" i="0" dirty="0" smtClean="0">
+                          <a:solidFill>
+                            <a:schemeClr val="tx1"/>
+                          </a:solidFill>
+                          <a:latin typeface="Courier New" pitchFamily="49" charset="0"/>
+                        </a:rPr>
+                        <a:t>;</a:t>
+                      </a:r>
+                    </a:p>
+                  </a:txBody>
+                  <a:tcPr marL="91421" marR="91421" marT="45583" marB="45583">
+                    <a:solidFill>
+                      <a:schemeClr val="bg1">
+                        <a:lumMod val="95000"/>
+                      </a:schemeClr>
+                    </a:solidFill>
+                  </a:tcPr>
+                </a:tc>
+              </a:tr>
+            </a:tbl>
+          </a:graphicData>
+        </a:graphic>
+      </p:graphicFrame>
     </p:spTree>
     <p:extLst>
       <p:ext uri="{BB962C8B-B14F-4D97-AF65-F5344CB8AC3E}">
-        <p14:creationId xmlns:p14="http://schemas.microsoft.com/office/powerpoint/2010/main" val="1688865195"/>
+        <p14:creationId xmlns:p14="http://schemas.microsoft.com/office/powerpoint/2010/main" val="3898204510"/>
       </p:ext>
     </p:extLst>
   </p:cSld>
@@ -6571,10 +8016,1908 @@
           <a:chExt cx="0" cy="0"/>
         </a:xfrm>
       </p:grpSpPr>
+      <p:sp>
+        <p:nvSpPr>
+          <p:cNvPr id="3" name="Title 2"/>
+          <p:cNvSpPr>
+            <a:spLocks noGrp="1"/>
+          </p:cNvSpPr>
+          <p:nvPr>
+            <p:ph type="title"/>
+          </p:nvPr>
+        </p:nvSpPr>
+        <p:spPr/>
+        <p:txBody>
+          <a:bodyPr/>
+          <a:lstStyle/>
+          <a:p>
+            <a:r>
+              <a:rPr lang="en-GB" b="1" dirty="0" smtClean="0"/>
+              <a:t>Creating Protected Types</a:t>
+            </a:r>
+            <a:endParaRPr lang="en-GB" b="1" dirty="0"/>
+          </a:p>
+        </p:txBody>
+      </p:sp>
+      <p:sp>
+        <p:nvSpPr>
+          <p:cNvPr id="4" name="Content Placeholder 3"/>
+          <p:cNvSpPr>
+            <a:spLocks noGrp="1"/>
+          </p:cNvSpPr>
+          <p:nvPr>
+            <p:ph sz="half" idx="10"/>
+          </p:nvPr>
+        </p:nvSpPr>
+        <p:spPr>
+          <a:xfrm>
+            <a:off x="685800" y="1143000"/>
+            <a:ext cx="7848600" cy="1053123"/>
+          </a:xfrm>
+        </p:spPr>
+        <p:txBody>
+          <a:bodyPr/>
+          <a:lstStyle/>
+          <a:p>
+            <a:r>
+              <a:rPr lang="en-GB" dirty="0" smtClean="0"/>
+              <a:t>This section of code creates a simple protected type to provide a synchronization point once each task finishes</a:t>
+            </a:r>
+            <a:endParaRPr lang="en-GB" dirty="0"/>
+          </a:p>
+        </p:txBody>
+      </p:sp>
+      <p:graphicFrame>
+        <p:nvGraphicFramePr>
+          <p:cNvPr id="5" name="Tableau 5"/>
+          <p:cNvGraphicFramePr>
+            <a:graphicFrameLocks noGrp="1"/>
+          </p:cNvGraphicFramePr>
+          <p:nvPr>
+            <p:extLst>
+              <p:ext uri="{D42A27DB-BD31-4B8C-83A1-F6EECF244321}">
+                <p14:modId xmlns:p14="http://schemas.microsoft.com/office/powerpoint/2010/main" val="144569374"/>
+              </p:ext>
+            </p:extLst>
+          </p:nvPr>
+        </p:nvGraphicFramePr>
+        <p:xfrm>
+          <a:off x="862666" y="2122475"/>
+          <a:ext cx="7293625" cy="4282166"/>
+        </p:xfrm>
+        <a:graphic>
+          <a:graphicData uri="http://schemas.openxmlformats.org/drawingml/2006/table">
+            <a:tbl>
+              <a:tblPr firstRow="1" bandRow="1">
+                <a:tableStyleId>{5C22544A-7EE6-4342-B048-85BDC9FD1C3A}</a:tableStyleId>
+              </a:tblPr>
+              <a:tblGrid>
+                <a:gridCol w="7293625"/>
+              </a:tblGrid>
+              <a:tr h="2913239">
+                <a:tc>
+                  <a:txBody>
+                    <a:bodyPr/>
+                    <a:lstStyle/>
+                    <a:p>
+                      <a:r>
+                        <a:rPr lang="en-US" sz="1100" b="1" dirty="0" smtClean="0">
+                          <a:solidFill>
+                            <a:schemeClr val="tx1"/>
+                          </a:solidFill>
+                          <a:latin typeface="Courier New" pitchFamily="49" charset="0"/>
+                        </a:rPr>
+                        <a:t>… </a:t>
+                      </a:r>
+                    </a:p>
+                    <a:p>
+                      <a:r>
+                        <a:rPr lang="en-US" sz="1100" b="1" dirty="0" smtClean="0">
+                          <a:solidFill>
+                            <a:schemeClr val="tx1"/>
+                          </a:solidFill>
+                          <a:latin typeface="Courier New" pitchFamily="49" charset="0"/>
+                        </a:rPr>
+                        <a:t>protected type </a:t>
+                      </a:r>
+                      <a:r>
+                        <a:rPr lang="en-US" sz="1100" b="0" dirty="0" err="1" smtClean="0">
+                          <a:solidFill>
+                            <a:schemeClr val="tx1"/>
+                          </a:solidFill>
+                          <a:latin typeface="Courier New" pitchFamily="49" charset="0"/>
+                        </a:rPr>
+                        <a:t>Result_Data</a:t>
+                      </a:r>
+                      <a:r>
+                        <a:rPr lang="en-US" sz="1100" b="1" dirty="0" smtClean="0">
+                          <a:solidFill>
+                            <a:schemeClr val="tx1"/>
+                          </a:solidFill>
+                          <a:latin typeface="Courier New" pitchFamily="49" charset="0"/>
+                        </a:rPr>
+                        <a:t> is</a:t>
+                      </a:r>
+                    </a:p>
+                    <a:p>
+                      <a:r>
+                        <a:rPr lang="en-US" sz="1100" b="1" dirty="0" smtClean="0">
+                          <a:solidFill>
+                            <a:schemeClr val="tx1"/>
+                          </a:solidFill>
+                          <a:latin typeface="Courier New" pitchFamily="49" charset="0"/>
+                        </a:rPr>
+                        <a:t>   procedure </a:t>
+                      </a:r>
+                      <a:r>
+                        <a:rPr lang="en-US" sz="1100" b="0" dirty="0" smtClean="0">
+                          <a:solidFill>
+                            <a:schemeClr val="tx1"/>
+                          </a:solidFill>
+                          <a:latin typeface="Courier New" pitchFamily="49" charset="0"/>
+                        </a:rPr>
+                        <a:t>Add (Amount</a:t>
+                      </a:r>
+                      <a:r>
+                        <a:rPr lang="en-US" sz="1100" b="1" dirty="0" smtClean="0">
+                          <a:solidFill>
+                            <a:schemeClr val="tx1"/>
+                          </a:solidFill>
+                          <a:latin typeface="Courier New" pitchFamily="49" charset="0"/>
+                        </a:rPr>
+                        <a:t> : in </a:t>
+                      </a:r>
+                      <a:r>
+                        <a:rPr lang="en-US" sz="1100" b="0" dirty="0" err="1" smtClean="0">
+                          <a:solidFill>
+                            <a:schemeClr val="tx1"/>
+                          </a:solidFill>
+                          <a:latin typeface="Courier New" pitchFamily="49" charset="0"/>
+                        </a:rPr>
+                        <a:t>Long_Long_Float</a:t>
+                      </a:r>
+                      <a:r>
+                        <a:rPr lang="en-US" sz="1100" b="0" dirty="0" smtClean="0">
+                          <a:solidFill>
+                            <a:schemeClr val="tx1"/>
+                          </a:solidFill>
+                          <a:latin typeface="Courier New" pitchFamily="49" charset="0"/>
+                        </a:rPr>
+                        <a:t>);</a:t>
+                      </a:r>
+                    </a:p>
+                    <a:p>
+                      <a:r>
+                        <a:rPr lang="en-US" sz="1100" b="1" dirty="0" smtClean="0">
+                          <a:solidFill>
+                            <a:schemeClr val="tx1"/>
+                          </a:solidFill>
+                          <a:latin typeface="Courier New" pitchFamily="49" charset="0"/>
+                        </a:rPr>
+                        <a:t>   procedure </a:t>
+                      </a:r>
+                      <a:r>
+                        <a:rPr lang="en-US" sz="1100" b="0" dirty="0" smtClean="0">
+                          <a:solidFill>
+                            <a:schemeClr val="tx1"/>
+                          </a:solidFill>
+                          <a:latin typeface="Courier New" pitchFamily="49" charset="0"/>
+                        </a:rPr>
+                        <a:t>Clear;</a:t>
+                      </a:r>
+                    </a:p>
+                    <a:p>
+                      <a:r>
+                        <a:rPr lang="en-US" sz="1100" b="1" dirty="0" smtClean="0">
+                          <a:solidFill>
+                            <a:schemeClr val="tx1"/>
+                          </a:solidFill>
+                          <a:latin typeface="Courier New" pitchFamily="49" charset="0"/>
+                        </a:rPr>
+                        <a:t>   function </a:t>
+                      </a:r>
+                      <a:r>
+                        <a:rPr lang="en-US" sz="1100" b="0" dirty="0" smtClean="0">
+                          <a:solidFill>
+                            <a:schemeClr val="tx1"/>
+                          </a:solidFill>
+                          <a:latin typeface="Courier New" pitchFamily="49" charset="0"/>
+                        </a:rPr>
+                        <a:t>Get</a:t>
+                      </a:r>
+                    </a:p>
+                    <a:p>
+                      <a:r>
+                        <a:rPr lang="en-US" sz="1100" b="1" dirty="0" smtClean="0">
+                          <a:solidFill>
+                            <a:schemeClr val="tx1"/>
+                          </a:solidFill>
+                          <a:latin typeface="Courier New" pitchFamily="49" charset="0"/>
+                        </a:rPr>
+                        <a:t>      return </a:t>
+                      </a:r>
+                      <a:r>
+                        <a:rPr lang="en-US" sz="1100" b="0" dirty="0" err="1" smtClean="0">
+                          <a:solidFill>
+                            <a:schemeClr val="tx1"/>
+                          </a:solidFill>
+                          <a:latin typeface="Courier New" pitchFamily="49" charset="0"/>
+                        </a:rPr>
+                        <a:t>Long_Long_Float</a:t>
+                      </a:r>
+                      <a:r>
+                        <a:rPr lang="en-US" sz="1100" b="0" dirty="0" smtClean="0">
+                          <a:solidFill>
+                            <a:schemeClr val="tx1"/>
+                          </a:solidFill>
+                          <a:latin typeface="Courier New" pitchFamily="49" charset="0"/>
+                        </a:rPr>
+                        <a:t>;</a:t>
+                      </a:r>
+                    </a:p>
+                    <a:p>
+                      <a:r>
+                        <a:rPr lang="en-US" sz="1100" b="1" dirty="0" smtClean="0">
+                          <a:solidFill>
+                            <a:schemeClr val="tx1"/>
+                          </a:solidFill>
+                          <a:latin typeface="Courier New" pitchFamily="49" charset="0"/>
+                        </a:rPr>
+                        <a:t>private</a:t>
+                      </a:r>
+                    </a:p>
+                    <a:p>
+                      <a:r>
+                        <a:rPr lang="en-US" sz="1100" b="1" dirty="0" smtClean="0">
+                          <a:solidFill>
+                            <a:schemeClr val="tx1"/>
+                          </a:solidFill>
+                          <a:latin typeface="Courier New" pitchFamily="49" charset="0"/>
+                        </a:rPr>
+                        <a:t>   </a:t>
+                      </a:r>
+                      <a:r>
+                        <a:rPr lang="en-US" sz="1100" b="0" dirty="0" smtClean="0">
+                          <a:solidFill>
+                            <a:schemeClr val="tx1"/>
+                          </a:solidFill>
+                          <a:latin typeface="Courier New" pitchFamily="49" charset="0"/>
+                        </a:rPr>
+                        <a:t>Data : </a:t>
+                      </a:r>
+                      <a:r>
+                        <a:rPr lang="en-US" sz="1100" b="0" dirty="0" err="1" smtClean="0">
+                          <a:solidFill>
+                            <a:schemeClr val="tx1"/>
+                          </a:solidFill>
+                          <a:latin typeface="Courier New" pitchFamily="49" charset="0"/>
+                        </a:rPr>
+                        <a:t>Long_Long_Float</a:t>
+                      </a:r>
+                      <a:r>
+                        <a:rPr lang="en-US" sz="1100" b="0" dirty="0" smtClean="0">
+                          <a:solidFill>
+                            <a:schemeClr val="tx1"/>
+                          </a:solidFill>
+                          <a:latin typeface="Courier New" pitchFamily="49" charset="0"/>
+                        </a:rPr>
+                        <a:t> := 0.0; </a:t>
+                      </a:r>
+                      <a:r>
+                        <a:rPr lang="en-US" sz="1100" b="0" i="1" dirty="0" smtClean="0">
+                          <a:solidFill>
+                            <a:schemeClr val="tx1"/>
+                          </a:solidFill>
+                          <a:latin typeface="Courier New" pitchFamily="49" charset="0"/>
+                        </a:rPr>
+                        <a:t>--</a:t>
+                      </a:r>
+                      <a:r>
+                        <a:rPr lang="en-US" sz="1100" b="0" i="1" baseline="0" dirty="0" smtClean="0">
+                          <a:solidFill>
+                            <a:schemeClr val="tx1"/>
+                          </a:solidFill>
+                          <a:latin typeface="Courier New" pitchFamily="49" charset="0"/>
+                        </a:rPr>
+                        <a:t> Untouchable outside the body of the type</a:t>
+                      </a:r>
+                      <a:endParaRPr lang="en-US" sz="1100" b="0" dirty="0" smtClean="0">
+                        <a:solidFill>
+                          <a:schemeClr val="tx1"/>
+                        </a:solidFill>
+                        <a:latin typeface="Courier New" pitchFamily="49" charset="0"/>
+                      </a:endParaRPr>
+                    </a:p>
+                    <a:p>
+                      <a:r>
+                        <a:rPr lang="en-US" sz="1100" b="1" dirty="0" smtClean="0">
+                          <a:solidFill>
+                            <a:schemeClr val="tx1"/>
+                          </a:solidFill>
+                          <a:latin typeface="Courier New" pitchFamily="49" charset="0"/>
+                        </a:rPr>
+                        <a:t>end </a:t>
+                      </a:r>
+                      <a:r>
+                        <a:rPr lang="en-US" sz="1100" b="0" dirty="0" err="1" smtClean="0">
+                          <a:solidFill>
+                            <a:schemeClr val="tx1"/>
+                          </a:solidFill>
+                          <a:latin typeface="Courier New" pitchFamily="49" charset="0"/>
+                        </a:rPr>
+                        <a:t>Result_Data</a:t>
+                      </a:r>
+                      <a:r>
+                        <a:rPr lang="en-US" sz="1100" b="0" dirty="0" smtClean="0">
+                          <a:solidFill>
+                            <a:schemeClr val="tx1"/>
+                          </a:solidFill>
+                          <a:latin typeface="Courier New" pitchFamily="49" charset="0"/>
+                        </a:rPr>
+                        <a:t>;</a:t>
+                      </a:r>
+                    </a:p>
+                    <a:p>
+                      <a:endParaRPr lang="en-US" sz="1100" b="1" dirty="0" smtClean="0">
+                        <a:solidFill>
+                          <a:schemeClr val="tx1"/>
+                        </a:solidFill>
+                        <a:latin typeface="Courier New" pitchFamily="49" charset="0"/>
+                      </a:endParaRPr>
+                    </a:p>
+                    <a:p>
+                      <a:r>
+                        <a:rPr lang="en-US" sz="1100" b="1" dirty="0" smtClean="0">
+                          <a:solidFill>
+                            <a:schemeClr val="tx1"/>
+                          </a:solidFill>
+                          <a:latin typeface="Courier New" pitchFamily="49" charset="0"/>
+                        </a:rPr>
+                        <a:t>protected body </a:t>
+                      </a:r>
+                      <a:r>
+                        <a:rPr lang="en-US" sz="1100" b="0" dirty="0" err="1" smtClean="0">
+                          <a:solidFill>
+                            <a:schemeClr val="tx1"/>
+                          </a:solidFill>
+                          <a:latin typeface="Courier New" pitchFamily="49" charset="0"/>
+                        </a:rPr>
+                        <a:t>Result_Data</a:t>
+                      </a:r>
+                      <a:r>
+                        <a:rPr lang="en-US" sz="1100" b="1" dirty="0" smtClean="0">
+                          <a:solidFill>
+                            <a:schemeClr val="tx1"/>
+                          </a:solidFill>
+                          <a:latin typeface="Courier New" pitchFamily="49" charset="0"/>
+                        </a:rPr>
+                        <a:t> is</a:t>
+                      </a:r>
+                    </a:p>
+                    <a:p>
+                      <a:r>
+                        <a:rPr lang="en-US" sz="1100" b="1" dirty="0" smtClean="0">
+                          <a:solidFill>
+                            <a:schemeClr val="tx1"/>
+                          </a:solidFill>
+                          <a:latin typeface="Courier New" pitchFamily="49" charset="0"/>
+                        </a:rPr>
+                        <a:t>   procedure </a:t>
+                      </a:r>
+                      <a:r>
+                        <a:rPr lang="en-US" sz="1100" b="0" dirty="0" smtClean="0">
+                          <a:solidFill>
+                            <a:schemeClr val="tx1"/>
+                          </a:solidFill>
+                          <a:latin typeface="Courier New" pitchFamily="49" charset="0"/>
+                        </a:rPr>
+                        <a:t>Clear</a:t>
+                      </a:r>
+                      <a:r>
+                        <a:rPr lang="en-US" sz="1100" b="1" dirty="0" smtClean="0">
+                          <a:solidFill>
+                            <a:schemeClr val="tx1"/>
+                          </a:solidFill>
+                          <a:latin typeface="Courier New" pitchFamily="49" charset="0"/>
+                        </a:rPr>
+                        <a:t> is</a:t>
+                      </a:r>
+                    </a:p>
+                    <a:p>
+                      <a:r>
+                        <a:rPr lang="en-US" sz="1100" b="1" dirty="0" smtClean="0">
+                          <a:solidFill>
+                            <a:schemeClr val="tx1"/>
+                          </a:solidFill>
+                          <a:latin typeface="Courier New" pitchFamily="49" charset="0"/>
+                        </a:rPr>
+                        <a:t>   begin</a:t>
+                      </a:r>
+                    </a:p>
+                    <a:p>
+                      <a:r>
+                        <a:rPr lang="en-US" sz="1100" b="1" dirty="0" smtClean="0">
+                          <a:solidFill>
+                            <a:schemeClr val="tx1"/>
+                          </a:solidFill>
+                          <a:latin typeface="Courier New" pitchFamily="49" charset="0"/>
+                        </a:rPr>
+                        <a:t>      </a:t>
+                      </a:r>
+                      <a:r>
+                        <a:rPr lang="en-US" sz="1100" b="0" dirty="0" smtClean="0">
+                          <a:solidFill>
+                            <a:schemeClr val="tx1"/>
+                          </a:solidFill>
+                          <a:latin typeface="Courier New" pitchFamily="49" charset="0"/>
+                        </a:rPr>
+                        <a:t>Data := 0.0;</a:t>
+                      </a:r>
+                    </a:p>
+                    <a:p>
+                      <a:r>
+                        <a:rPr lang="en-US" sz="1100" b="1" dirty="0" smtClean="0">
+                          <a:solidFill>
+                            <a:schemeClr val="tx1"/>
+                          </a:solidFill>
+                          <a:latin typeface="Courier New" pitchFamily="49" charset="0"/>
+                        </a:rPr>
+                        <a:t>   end </a:t>
+                      </a:r>
+                      <a:r>
+                        <a:rPr lang="en-US" sz="1100" b="0" dirty="0" smtClean="0">
+                          <a:solidFill>
+                            <a:schemeClr val="tx1"/>
+                          </a:solidFill>
+                          <a:latin typeface="Courier New" pitchFamily="49" charset="0"/>
+                        </a:rPr>
+                        <a:t>Clear;</a:t>
+                      </a:r>
+                    </a:p>
+                    <a:p>
+                      <a:r>
+                        <a:rPr lang="en-US" sz="1100" b="1" dirty="0" smtClean="0">
+                          <a:solidFill>
+                            <a:schemeClr val="tx1"/>
+                          </a:solidFill>
+                          <a:latin typeface="Courier New" pitchFamily="49" charset="0"/>
+                        </a:rPr>
+                        <a:t>   function </a:t>
+                      </a:r>
+                      <a:r>
+                        <a:rPr lang="en-US" sz="1100" b="0" dirty="0" smtClean="0">
+                          <a:solidFill>
+                            <a:schemeClr val="tx1"/>
+                          </a:solidFill>
+                          <a:latin typeface="Courier New" pitchFamily="49" charset="0"/>
+                        </a:rPr>
+                        <a:t>Get</a:t>
+                      </a:r>
+                      <a:r>
+                        <a:rPr lang="en-US" sz="1100" b="1" dirty="0" smtClean="0">
+                          <a:solidFill>
+                            <a:schemeClr val="tx1"/>
+                          </a:solidFill>
+                          <a:latin typeface="Courier New" pitchFamily="49" charset="0"/>
+                        </a:rPr>
+                        <a:t> return </a:t>
+                      </a:r>
+                      <a:r>
+                        <a:rPr lang="en-US" sz="1100" b="0" dirty="0" err="1" smtClean="0">
+                          <a:solidFill>
+                            <a:schemeClr val="tx1"/>
+                          </a:solidFill>
+                          <a:latin typeface="Courier New" pitchFamily="49" charset="0"/>
+                        </a:rPr>
+                        <a:t>Long_Long_Float</a:t>
+                      </a:r>
+                      <a:r>
+                        <a:rPr lang="en-US" sz="1100" b="1" dirty="0" smtClean="0">
+                          <a:solidFill>
+                            <a:schemeClr val="tx1"/>
+                          </a:solidFill>
+                          <a:latin typeface="Courier New" pitchFamily="49" charset="0"/>
+                        </a:rPr>
+                        <a:t> is</a:t>
+                      </a:r>
+                    </a:p>
+                    <a:p>
+                      <a:r>
+                        <a:rPr lang="en-US" sz="1100" b="1" dirty="0" smtClean="0">
+                          <a:solidFill>
+                            <a:schemeClr val="tx1"/>
+                          </a:solidFill>
+                          <a:latin typeface="Courier New" pitchFamily="49" charset="0"/>
+                        </a:rPr>
+                        <a:t>   begin</a:t>
+                      </a:r>
+                    </a:p>
+                    <a:p>
+                      <a:r>
+                        <a:rPr lang="en-US" sz="1100" b="1" dirty="0" smtClean="0">
+                          <a:solidFill>
+                            <a:schemeClr val="tx1"/>
+                          </a:solidFill>
+                          <a:latin typeface="Courier New" pitchFamily="49" charset="0"/>
+                        </a:rPr>
+                        <a:t>      return </a:t>
+                      </a:r>
+                      <a:r>
+                        <a:rPr lang="en-US" sz="1100" b="0" dirty="0" smtClean="0">
+                          <a:solidFill>
+                            <a:schemeClr val="tx1"/>
+                          </a:solidFill>
+                          <a:latin typeface="Courier New" pitchFamily="49" charset="0"/>
+                        </a:rPr>
+                        <a:t>Data;</a:t>
+                      </a:r>
+                    </a:p>
+                    <a:p>
+                      <a:r>
+                        <a:rPr lang="en-US" sz="1100" b="1" dirty="0" smtClean="0">
+                          <a:solidFill>
+                            <a:schemeClr val="tx1"/>
+                          </a:solidFill>
+                          <a:latin typeface="Courier New" pitchFamily="49" charset="0"/>
+                        </a:rPr>
+                        <a:t>   end </a:t>
+                      </a:r>
+                      <a:r>
+                        <a:rPr lang="en-US" sz="1100" b="0" dirty="0" smtClean="0">
+                          <a:solidFill>
+                            <a:schemeClr val="tx1"/>
+                          </a:solidFill>
+                          <a:latin typeface="Courier New" pitchFamily="49" charset="0"/>
+                        </a:rPr>
+                        <a:t>Get;</a:t>
+                      </a:r>
+                    </a:p>
+                    <a:p>
+                      <a:r>
+                        <a:rPr lang="en-US" sz="1100" b="1" dirty="0" smtClean="0">
+                          <a:solidFill>
+                            <a:schemeClr val="tx1"/>
+                          </a:solidFill>
+                          <a:latin typeface="Courier New" pitchFamily="49" charset="0"/>
+                        </a:rPr>
+                        <a:t>   procedure </a:t>
+                      </a:r>
+                      <a:r>
+                        <a:rPr lang="en-US" sz="1100" b="0" dirty="0" smtClean="0">
+                          <a:solidFill>
+                            <a:schemeClr val="tx1"/>
+                          </a:solidFill>
+                          <a:latin typeface="Courier New" pitchFamily="49" charset="0"/>
+                        </a:rPr>
+                        <a:t>Add (Amount : </a:t>
+                      </a:r>
+                      <a:r>
+                        <a:rPr lang="en-US" sz="1100" b="1" dirty="0" smtClean="0">
+                          <a:solidFill>
+                            <a:schemeClr val="tx1"/>
+                          </a:solidFill>
+                          <a:latin typeface="Courier New" pitchFamily="49" charset="0"/>
+                        </a:rPr>
+                        <a:t>in</a:t>
+                      </a:r>
+                      <a:r>
+                        <a:rPr lang="en-US" sz="1100" b="0" dirty="0" smtClean="0">
+                          <a:solidFill>
+                            <a:schemeClr val="tx1"/>
+                          </a:solidFill>
+                          <a:latin typeface="Courier New" pitchFamily="49" charset="0"/>
+                        </a:rPr>
+                        <a:t> </a:t>
+                      </a:r>
+                      <a:r>
+                        <a:rPr lang="en-US" sz="1100" b="0" dirty="0" err="1" smtClean="0">
+                          <a:solidFill>
+                            <a:schemeClr val="tx1"/>
+                          </a:solidFill>
+                          <a:latin typeface="Courier New" pitchFamily="49" charset="0"/>
+                        </a:rPr>
+                        <a:t>Long_Long_Float</a:t>
+                      </a:r>
+                      <a:r>
+                        <a:rPr lang="en-US" sz="1100" b="0" dirty="0" smtClean="0">
+                          <a:solidFill>
+                            <a:schemeClr val="tx1"/>
+                          </a:solidFill>
+                          <a:latin typeface="Courier New" pitchFamily="49" charset="0"/>
+                        </a:rPr>
+                        <a:t>)</a:t>
+                      </a:r>
+                      <a:r>
+                        <a:rPr lang="en-US" sz="1100" b="1" dirty="0" smtClean="0">
+                          <a:solidFill>
+                            <a:schemeClr val="tx1"/>
+                          </a:solidFill>
+                          <a:latin typeface="Courier New" pitchFamily="49" charset="0"/>
+                        </a:rPr>
+                        <a:t> is</a:t>
+                      </a:r>
+                    </a:p>
+                    <a:p>
+                      <a:r>
+                        <a:rPr lang="en-US" sz="1100" b="1" dirty="0" smtClean="0">
+                          <a:solidFill>
+                            <a:schemeClr val="tx1"/>
+                          </a:solidFill>
+                          <a:latin typeface="Courier New" pitchFamily="49" charset="0"/>
+                        </a:rPr>
+                        <a:t>   begin</a:t>
+                      </a:r>
+                    </a:p>
+                    <a:p>
+                      <a:r>
+                        <a:rPr lang="en-US" sz="1100" b="1" dirty="0" smtClean="0">
+                          <a:solidFill>
+                            <a:schemeClr val="tx1"/>
+                          </a:solidFill>
+                          <a:latin typeface="Courier New" pitchFamily="49" charset="0"/>
+                        </a:rPr>
+                        <a:t>      </a:t>
+                      </a:r>
+                      <a:r>
+                        <a:rPr lang="en-US" sz="1100" b="0" dirty="0" smtClean="0">
+                          <a:solidFill>
+                            <a:schemeClr val="tx1"/>
+                          </a:solidFill>
+                          <a:latin typeface="Courier New" pitchFamily="49" charset="0"/>
+                        </a:rPr>
+                        <a:t>Data := Data + Amount;</a:t>
+                      </a:r>
+                    </a:p>
+                    <a:p>
+                      <a:r>
+                        <a:rPr lang="en-US" sz="1100" b="1" dirty="0" smtClean="0">
+                          <a:solidFill>
+                            <a:schemeClr val="tx1"/>
+                          </a:solidFill>
+                          <a:latin typeface="Courier New" pitchFamily="49" charset="0"/>
+                        </a:rPr>
+                        <a:t>   end </a:t>
+                      </a:r>
+                      <a:r>
+                        <a:rPr lang="en-US" sz="1100" b="0" dirty="0" smtClean="0">
+                          <a:solidFill>
+                            <a:schemeClr val="tx1"/>
+                          </a:solidFill>
+                          <a:latin typeface="Courier New" pitchFamily="49" charset="0"/>
+                        </a:rPr>
+                        <a:t>Add;</a:t>
+                      </a:r>
+                    </a:p>
+                    <a:p>
+                      <a:r>
+                        <a:rPr lang="en-US" sz="1100" b="1" dirty="0" smtClean="0">
+                          <a:solidFill>
+                            <a:schemeClr val="tx1"/>
+                          </a:solidFill>
+                          <a:latin typeface="Courier New" pitchFamily="49" charset="0"/>
+                        </a:rPr>
+                        <a:t>end </a:t>
+                      </a:r>
+                      <a:r>
+                        <a:rPr lang="en-US" sz="1100" b="0" dirty="0" err="1" smtClean="0">
+                          <a:solidFill>
+                            <a:schemeClr val="tx1"/>
+                          </a:solidFill>
+                          <a:latin typeface="Courier New" pitchFamily="49" charset="0"/>
+                        </a:rPr>
+                        <a:t>Result_Data</a:t>
+                      </a:r>
+                      <a:r>
+                        <a:rPr lang="en-US" sz="1100" b="0" dirty="0" smtClean="0">
+                          <a:solidFill>
+                            <a:schemeClr val="tx1"/>
+                          </a:solidFill>
+                          <a:latin typeface="Courier New" pitchFamily="49" charset="0"/>
+                        </a:rPr>
+                        <a:t>;</a:t>
+                      </a:r>
+                    </a:p>
+                    <a:p>
+                      <a:r>
+                        <a:rPr lang="en-US" sz="1100" b="1" dirty="0" smtClean="0">
+                          <a:solidFill>
+                            <a:schemeClr val="tx1"/>
+                          </a:solidFill>
+                          <a:latin typeface="Courier New" pitchFamily="49" charset="0"/>
+                        </a:rPr>
+                        <a:t>…</a:t>
+                      </a:r>
+                      <a:endParaRPr lang="en-US" sz="1100" b="0" dirty="0" smtClean="0">
+                        <a:solidFill>
+                          <a:schemeClr val="tx1"/>
+                        </a:solidFill>
+                        <a:latin typeface="Courier New" pitchFamily="49" charset="0"/>
+                      </a:endParaRPr>
+                    </a:p>
+                  </a:txBody>
+                  <a:tcPr marL="91421" marR="91421" marT="45583" marB="45583">
+                    <a:solidFill>
+                      <a:schemeClr val="bg1">
+                        <a:lumMod val="95000"/>
+                      </a:schemeClr>
+                    </a:solidFill>
+                  </a:tcPr>
+                </a:tc>
+              </a:tr>
+            </a:tbl>
+          </a:graphicData>
+        </a:graphic>
+      </p:graphicFrame>
     </p:spTree>
     <p:extLst>
       <p:ext uri="{BB962C8B-B14F-4D97-AF65-F5344CB8AC3E}">
-        <p14:creationId xmlns:p14="http://schemas.microsoft.com/office/powerpoint/2010/main" val="3343519894"/>
+        <p14:creationId xmlns:p14="http://schemas.microsoft.com/office/powerpoint/2010/main" val="3965846747"/>
+      </p:ext>
+    </p:extLst>
+  </p:cSld>
+  <p:clrMapOvr>
+    <a:masterClrMapping/>
+  </p:clrMapOvr>
+</p:sld>
+</file>
+
+<file path=ppt/slides/slide6.xml><?xml version="1.0" encoding="utf-8"?>
+<p:sld xmlns:a="http://schemas.openxmlformats.org/drawingml/2006/main" xmlns:r="http://schemas.openxmlformats.org/officeDocument/2006/relationships" xmlns:p="http://schemas.openxmlformats.org/presentationml/2006/main">
+  <p:cSld>
+    <p:spTree>
+      <p:nvGrpSpPr>
+        <p:cNvPr id="1" name=""/>
+        <p:cNvGrpSpPr/>
+        <p:nvPr/>
+      </p:nvGrpSpPr>
+      <p:grpSpPr>
+        <a:xfrm>
+          <a:off x="0" y="0"/>
+          <a:ext cx="0" cy="0"/>
+          <a:chOff x="0" y="0"/>
+          <a:chExt cx="0" cy="0"/>
+        </a:xfrm>
+      </p:grpSpPr>
+      <p:sp>
+        <p:nvSpPr>
+          <p:cNvPr id="3" name="Title 2"/>
+          <p:cNvSpPr>
+            <a:spLocks noGrp="1"/>
+          </p:cNvSpPr>
+          <p:nvPr>
+            <p:ph type="title"/>
+          </p:nvPr>
+        </p:nvSpPr>
+        <p:spPr/>
+        <p:txBody>
+          <a:bodyPr/>
+          <a:lstStyle/>
+          <a:p>
+            <a:r>
+              <a:rPr lang="en-GB" b="1" dirty="0" smtClean="0"/>
+              <a:t>Using Protected Types with Task Types </a:t>
+            </a:r>
+            <a:endParaRPr lang="en-GB" b="1" dirty="0"/>
+          </a:p>
+        </p:txBody>
+      </p:sp>
+      <p:sp>
+        <p:nvSpPr>
+          <p:cNvPr id="4" name="Content Placeholder 3"/>
+          <p:cNvSpPr>
+            <a:spLocks noGrp="1"/>
+          </p:cNvSpPr>
+          <p:nvPr>
+            <p:ph sz="half" idx="10"/>
+          </p:nvPr>
+        </p:nvSpPr>
+        <p:spPr>
+          <a:xfrm>
+            <a:off x="685800" y="1143001"/>
+            <a:ext cx="7848600" cy="974968"/>
+          </a:xfrm>
+        </p:spPr>
+        <p:txBody>
+          <a:bodyPr/>
+          <a:lstStyle/>
+          <a:p>
+            <a:r>
+              <a:rPr lang="en-GB" dirty="0" smtClean="0"/>
+              <a:t>This section of code is similar to other examples in the previous chapter</a:t>
+            </a:r>
+            <a:endParaRPr lang="en-GB" dirty="0"/>
+          </a:p>
+        </p:txBody>
+      </p:sp>
+      <p:graphicFrame>
+        <p:nvGraphicFramePr>
+          <p:cNvPr id="5" name="Tableau 5"/>
+          <p:cNvGraphicFramePr>
+            <a:graphicFrameLocks noGrp="1"/>
+          </p:cNvGraphicFramePr>
+          <p:nvPr>
+            <p:extLst>
+              <p:ext uri="{D42A27DB-BD31-4B8C-83A1-F6EECF244321}">
+                <p14:modId xmlns:p14="http://schemas.microsoft.com/office/powerpoint/2010/main" val="122724560"/>
+              </p:ext>
+            </p:extLst>
+          </p:nvPr>
+        </p:nvGraphicFramePr>
+        <p:xfrm>
+          <a:off x="862666" y="2122475"/>
+          <a:ext cx="7293625" cy="3946886"/>
+        </p:xfrm>
+        <a:graphic>
+          <a:graphicData uri="http://schemas.openxmlformats.org/drawingml/2006/table">
+            <a:tbl>
+              <a:tblPr firstRow="1" bandRow="1">
+                <a:tableStyleId>{5C22544A-7EE6-4342-B048-85BDC9FD1C3A}</a:tableStyleId>
+              </a:tblPr>
+              <a:tblGrid>
+                <a:gridCol w="7293625"/>
+              </a:tblGrid>
+              <a:tr h="2913239">
+                <a:tc>
+                  <a:txBody>
+                    <a:bodyPr/>
+                    <a:lstStyle/>
+                    <a:p>
+                      <a:r>
+                        <a:rPr lang="en-US" sz="1100" b="1" dirty="0" smtClean="0">
+                          <a:solidFill>
+                            <a:schemeClr val="tx1"/>
+                          </a:solidFill>
+                          <a:latin typeface="Courier New" pitchFamily="49" charset="0"/>
+                        </a:rPr>
+                        <a:t>… </a:t>
+                      </a:r>
+                      <a:endParaRPr lang="en-US" sz="1100" b="0" i="0" dirty="0" smtClean="0">
+                        <a:solidFill>
+                          <a:schemeClr val="tx1"/>
+                        </a:solidFill>
+                        <a:latin typeface="Courier New" pitchFamily="49" charset="0"/>
+                      </a:endParaRPr>
+                    </a:p>
+                    <a:p>
+                      <a:r>
+                        <a:rPr lang="en-US" sz="1100" b="0" i="0" dirty="0" smtClean="0">
+                          <a:solidFill>
+                            <a:schemeClr val="tx1"/>
+                          </a:solidFill>
+                          <a:latin typeface="Courier New" pitchFamily="49" charset="0"/>
+                        </a:rPr>
+                        <a:t>Sum : </a:t>
+                      </a:r>
+                      <a:r>
+                        <a:rPr lang="en-US" sz="1100" b="0" i="0" dirty="0" err="1" smtClean="0">
+                          <a:solidFill>
+                            <a:schemeClr val="tx1"/>
+                          </a:solidFill>
+                          <a:latin typeface="Courier New" pitchFamily="49" charset="0"/>
+                        </a:rPr>
+                        <a:t>Result_Data</a:t>
+                      </a:r>
+                      <a:r>
+                        <a:rPr lang="en-US" sz="1100" b="0" i="0" dirty="0" smtClean="0">
+                          <a:solidFill>
+                            <a:schemeClr val="tx1"/>
+                          </a:solidFill>
+                          <a:latin typeface="Courier New" pitchFamily="49" charset="0"/>
+                        </a:rPr>
+                        <a:t>; </a:t>
+                      </a:r>
+                      <a:r>
+                        <a:rPr lang="en-US" sz="1100" b="0" i="1" dirty="0" smtClean="0">
+                          <a:solidFill>
+                            <a:schemeClr val="tx1"/>
+                          </a:solidFill>
+                          <a:latin typeface="Courier New" pitchFamily="49" charset="0"/>
+                        </a:rPr>
+                        <a:t>-- Our protected type</a:t>
+                      </a:r>
+                    </a:p>
+                    <a:p>
+                      <a:r>
+                        <a:rPr lang="en-US" sz="1100" b="1" dirty="0" smtClean="0">
+                          <a:solidFill>
+                            <a:schemeClr val="tx1"/>
+                          </a:solidFill>
+                          <a:latin typeface="Courier New" pitchFamily="49" charset="0"/>
+                        </a:rPr>
+                        <a:t>…</a:t>
+                      </a:r>
+                    </a:p>
+                    <a:p>
+                      <a:r>
+                        <a:rPr lang="en-US" sz="1100" b="1" dirty="0" smtClean="0">
+                          <a:solidFill>
+                            <a:schemeClr val="tx1"/>
+                          </a:solidFill>
+                          <a:latin typeface="Courier New" pitchFamily="49" charset="0"/>
+                        </a:rPr>
+                        <a:t>task type </a:t>
+                      </a:r>
+                      <a:r>
+                        <a:rPr lang="en-US" sz="1100" b="0" dirty="0" err="1" smtClean="0">
+                          <a:solidFill>
+                            <a:schemeClr val="tx1"/>
+                          </a:solidFill>
+                          <a:latin typeface="Courier New" pitchFamily="49" charset="0"/>
+                        </a:rPr>
+                        <a:t>PI_Process</a:t>
+                      </a:r>
+                      <a:r>
+                        <a:rPr lang="en-US" sz="1100" b="1" dirty="0" smtClean="0">
+                          <a:solidFill>
+                            <a:schemeClr val="tx1"/>
+                          </a:solidFill>
+                          <a:latin typeface="Courier New" pitchFamily="49" charset="0"/>
+                        </a:rPr>
+                        <a:t> is</a:t>
+                      </a:r>
+                    </a:p>
+                    <a:p>
+                      <a:r>
+                        <a:rPr lang="en-US" sz="1100" b="1" dirty="0" smtClean="0">
+                          <a:solidFill>
+                            <a:schemeClr val="tx1"/>
+                          </a:solidFill>
+                          <a:latin typeface="Courier New" pitchFamily="49" charset="0"/>
+                        </a:rPr>
+                        <a:t>   entry </a:t>
+                      </a:r>
+                      <a:r>
+                        <a:rPr lang="en-US" sz="1100" b="0" dirty="0" smtClean="0">
+                          <a:solidFill>
+                            <a:schemeClr val="tx1"/>
+                          </a:solidFill>
+                          <a:latin typeface="Courier New" pitchFamily="49" charset="0"/>
+                        </a:rPr>
+                        <a:t>Initialize (Interval : </a:t>
+                      </a:r>
+                      <a:r>
+                        <a:rPr lang="en-US" sz="1100" b="1" dirty="0" smtClean="0">
+                          <a:solidFill>
+                            <a:schemeClr val="tx1"/>
+                          </a:solidFill>
+                          <a:latin typeface="Courier New" pitchFamily="49" charset="0"/>
+                        </a:rPr>
+                        <a:t>in</a:t>
+                      </a:r>
+                      <a:r>
+                        <a:rPr lang="en-US" sz="1100" b="0" dirty="0" smtClean="0">
+                          <a:solidFill>
+                            <a:schemeClr val="tx1"/>
+                          </a:solidFill>
+                          <a:latin typeface="Courier New" pitchFamily="49" charset="0"/>
+                        </a:rPr>
+                        <a:t> Positive; Total : </a:t>
+                      </a:r>
+                      <a:r>
+                        <a:rPr lang="en-US" sz="1100" b="1" dirty="0" smtClean="0">
+                          <a:solidFill>
+                            <a:schemeClr val="tx1"/>
+                          </a:solidFill>
+                          <a:latin typeface="Courier New" pitchFamily="49" charset="0"/>
+                        </a:rPr>
+                        <a:t>in</a:t>
+                      </a:r>
+                      <a:r>
+                        <a:rPr lang="en-US" sz="1100" b="0" dirty="0" smtClean="0">
+                          <a:solidFill>
+                            <a:schemeClr val="tx1"/>
+                          </a:solidFill>
+                          <a:latin typeface="Courier New" pitchFamily="49" charset="0"/>
+                        </a:rPr>
+                        <a:t> Positive);</a:t>
+                      </a:r>
+                    </a:p>
+                    <a:p>
+                      <a:r>
+                        <a:rPr lang="en-US" sz="1100" b="1" dirty="0" smtClean="0">
+                          <a:solidFill>
+                            <a:schemeClr val="tx1"/>
+                          </a:solidFill>
+                          <a:latin typeface="Courier New" pitchFamily="49" charset="0"/>
+                        </a:rPr>
+                        <a:t>end </a:t>
+                      </a:r>
+                      <a:r>
+                        <a:rPr lang="en-US" sz="1100" b="0" dirty="0" err="1" smtClean="0">
+                          <a:solidFill>
+                            <a:schemeClr val="tx1"/>
+                          </a:solidFill>
+                          <a:latin typeface="Courier New" pitchFamily="49" charset="0"/>
+                        </a:rPr>
+                        <a:t>PI_Process</a:t>
+                      </a:r>
+                      <a:r>
+                        <a:rPr lang="en-US" sz="1100" b="0" dirty="0" smtClean="0">
+                          <a:solidFill>
+                            <a:schemeClr val="tx1"/>
+                          </a:solidFill>
+                          <a:latin typeface="Courier New" pitchFamily="49" charset="0"/>
+                        </a:rPr>
+                        <a:t>;</a:t>
+                      </a:r>
+                    </a:p>
+                    <a:p>
+                      <a:endParaRPr lang="en-US" sz="1100" b="1" dirty="0" smtClean="0">
+                        <a:solidFill>
+                          <a:schemeClr val="tx1"/>
+                        </a:solidFill>
+                        <a:latin typeface="Courier New" pitchFamily="49" charset="0"/>
+                      </a:endParaRPr>
+                    </a:p>
+                    <a:p>
+                      <a:r>
+                        <a:rPr lang="en-US" sz="1100" b="1" dirty="0" smtClean="0">
+                          <a:solidFill>
+                            <a:schemeClr val="tx1"/>
+                          </a:solidFill>
+                          <a:latin typeface="Courier New" pitchFamily="49" charset="0"/>
+                        </a:rPr>
+                        <a:t>task body </a:t>
+                      </a:r>
+                      <a:r>
+                        <a:rPr lang="en-US" sz="1100" b="0" dirty="0" err="1" smtClean="0">
+                          <a:solidFill>
+                            <a:schemeClr val="tx1"/>
+                          </a:solidFill>
+                          <a:latin typeface="Courier New" pitchFamily="49" charset="0"/>
+                        </a:rPr>
+                        <a:t>PI_Process</a:t>
+                      </a:r>
+                      <a:r>
+                        <a:rPr lang="en-US" sz="1100" b="1" dirty="0" smtClean="0">
+                          <a:solidFill>
+                            <a:schemeClr val="tx1"/>
+                          </a:solidFill>
+                          <a:latin typeface="Courier New" pitchFamily="49" charset="0"/>
+                        </a:rPr>
+                        <a:t> is</a:t>
+                      </a:r>
+                    </a:p>
+                    <a:p>
+                      <a:r>
+                        <a:rPr lang="en-US" sz="1100" b="0" dirty="0" smtClean="0">
+                          <a:solidFill>
+                            <a:schemeClr val="tx1"/>
+                          </a:solidFill>
+                          <a:latin typeface="Courier New" pitchFamily="49" charset="0"/>
+                        </a:rPr>
+                        <a:t>I, T : Positive := 1;</a:t>
+                      </a:r>
+                    </a:p>
+                    <a:p>
+                      <a:r>
+                        <a:rPr lang="en-US" sz="1100" b="0" dirty="0" smtClean="0">
+                          <a:solidFill>
+                            <a:schemeClr val="tx1"/>
+                          </a:solidFill>
+                          <a:latin typeface="Courier New" pitchFamily="49" charset="0"/>
+                        </a:rPr>
+                        <a:t>S : </a:t>
+                      </a:r>
+                      <a:r>
+                        <a:rPr lang="en-US" sz="1100" b="0" dirty="0" err="1" smtClean="0">
+                          <a:solidFill>
+                            <a:schemeClr val="tx1"/>
+                          </a:solidFill>
+                          <a:latin typeface="Courier New" pitchFamily="49" charset="0"/>
+                        </a:rPr>
+                        <a:t>Long_Long_Float</a:t>
+                      </a:r>
+                      <a:r>
+                        <a:rPr lang="en-US" sz="1100" b="0" dirty="0" smtClean="0">
+                          <a:solidFill>
+                            <a:schemeClr val="tx1"/>
+                          </a:solidFill>
+                          <a:latin typeface="Courier New" pitchFamily="49" charset="0"/>
+                        </a:rPr>
+                        <a:t> := 0.0;</a:t>
+                      </a:r>
+                    </a:p>
+                    <a:p>
+                      <a:r>
+                        <a:rPr lang="en-US" sz="1100" b="1" dirty="0" smtClean="0">
+                          <a:solidFill>
+                            <a:schemeClr val="tx1"/>
+                          </a:solidFill>
+                          <a:latin typeface="Courier New" pitchFamily="49" charset="0"/>
+                        </a:rPr>
+                        <a:t>begin</a:t>
+                      </a:r>
+                    </a:p>
+                    <a:p>
+                      <a:r>
+                        <a:rPr lang="en-US" sz="1100" b="1" dirty="0" smtClean="0">
+                          <a:solidFill>
+                            <a:schemeClr val="tx1"/>
+                          </a:solidFill>
+                          <a:latin typeface="Courier New" pitchFamily="49" charset="0"/>
+                        </a:rPr>
+                        <a:t>   accept </a:t>
+                      </a:r>
+                      <a:r>
+                        <a:rPr lang="en-US" sz="1100" b="0" dirty="0" smtClean="0">
+                          <a:solidFill>
+                            <a:schemeClr val="tx1"/>
+                          </a:solidFill>
+                          <a:latin typeface="Courier New" pitchFamily="49" charset="0"/>
+                        </a:rPr>
+                        <a:t>Initialize (Interval : </a:t>
+                      </a:r>
+                      <a:r>
+                        <a:rPr lang="en-US" sz="1100" b="1" dirty="0" smtClean="0">
+                          <a:solidFill>
+                            <a:schemeClr val="tx1"/>
+                          </a:solidFill>
+                          <a:latin typeface="Courier New" pitchFamily="49" charset="0"/>
+                        </a:rPr>
+                        <a:t>in</a:t>
+                      </a:r>
+                      <a:r>
+                        <a:rPr lang="en-US" sz="1100" b="0" dirty="0" smtClean="0">
+                          <a:solidFill>
+                            <a:schemeClr val="tx1"/>
+                          </a:solidFill>
+                          <a:latin typeface="Courier New" pitchFamily="49" charset="0"/>
+                        </a:rPr>
+                        <a:t> Positive; Total : </a:t>
+                      </a:r>
+                      <a:r>
+                        <a:rPr lang="en-US" sz="1100" b="1" dirty="0" smtClean="0">
+                          <a:solidFill>
+                            <a:schemeClr val="tx1"/>
+                          </a:solidFill>
+                          <a:latin typeface="Courier New" pitchFamily="49" charset="0"/>
+                        </a:rPr>
+                        <a:t>in</a:t>
+                      </a:r>
+                      <a:r>
+                        <a:rPr lang="en-US" sz="1100" b="0" dirty="0" smtClean="0">
+                          <a:solidFill>
+                            <a:schemeClr val="tx1"/>
+                          </a:solidFill>
+                          <a:latin typeface="Courier New" pitchFamily="49" charset="0"/>
+                        </a:rPr>
+                        <a:t> Positive);</a:t>
+                      </a:r>
+                    </a:p>
+                    <a:p>
+                      <a:r>
+                        <a:rPr lang="en-US" sz="1100" b="1" dirty="0" smtClean="0">
+                          <a:solidFill>
+                            <a:schemeClr val="tx1"/>
+                          </a:solidFill>
+                          <a:latin typeface="Courier New" pitchFamily="49" charset="0"/>
+                        </a:rPr>
+                        <a:t>   do</a:t>
+                      </a:r>
+                    </a:p>
+                    <a:p>
+                      <a:r>
+                        <a:rPr lang="en-US" sz="1100" b="0" dirty="0" smtClean="0">
+                          <a:solidFill>
+                            <a:schemeClr val="tx1"/>
+                          </a:solidFill>
+                          <a:latin typeface="Courier New" pitchFamily="49" charset="0"/>
+                        </a:rPr>
+                        <a:t>      I := Interval;</a:t>
+                      </a:r>
+                    </a:p>
+                    <a:p>
+                      <a:r>
+                        <a:rPr lang="en-US" sz="1100" b="0" dirty="0" smtClean="0">
+                          <a:solidFill>
+                            <a:schemeClr val="tx1"/>
+                          </a:solidFill>
+                          <a:latin typeface="Courier New" pitchFamily="49" charset="0"/>
+                        </a:rPr>
+                        <a:t>      T := Total;</a:t>
+                      </a:r>
+                    </a:p>
+                    <a:p>
+                      <a:r>
+                        <a:rPr lang="en-US" sz="1100" b="1" dirty="0" smtClean="0">
+                          <a:solidFill>
+                            <a:schemeClr val="tx1"/>
+                          </a:solidFill>
+                          <a:latin typeface="Courier New" pitchFamily="49" charset="0"/>
+                        </a:rPr>
+                        <a:t>   end </a:t>
+                      </a:r>
+                      <a:r>
+                        <a:rPr lang="en-US" sz="1100" b="0" dirty="0" smtClean="0">
+                          <a:solidFill>
+                            <a:schemeClr val="tx1"/>
+                          </a:solidFill>
+                          <a:latin typeface="Courier New" pitchFamily="49" charset="0"/>
+                        </a:rPr>
+                        <a:t>Initialize;</a:t>
+                      </a:r>
+                    </a:p>
+                    <a:p>
+                      <a:r>
+                        <a:rPr lang="en-US" sz="1100" b="1" dirty="0" smtClean="0">
+                          <a:solidFill>
+                            <a:schemeClr val="tx1"/>
+                          </a:solidFill>
+                          <a:latin typeface="Courier New" pitchFamily="49" charset="0"/>
+                        </a:rPr>
+                        <a:t>   for</a:t>
+                      </a:r>
+                      <a:r>
+                        <a:rPr lang="en-US" sz="1100" b="0" dirty="0" smtClean="0">
+                          <a:solidFill>
+                            <a:schemeClr val="tx1"/>
+                          </a:solidFill>
+                          <a:latin typeface="Courier New" pitchFamily="49" charset="0"/>
+                        </a:rPr>
+                        <a:t> J </a:t>
+                      </a:r>
+                      <a:r>
+                        <a:rPr lang="en-US" sz="1100" b="1" dirty="0" smtClean="0">
+                          <a:solidFill>
+                            <a:schemeClr val="tx1"/>
+                          </a:solidFill>
+                          <a:latin typeface="Courier New" pitchFamily="49" charset="0"/>
+                        </a:rPr>
+                        <a:t>in</a:t>
+                      </a:r>
+                      <a:r>
+                        <a:rPr lang="en-US" sz="1100" b="0" dirty="0" smtClean="0">
+                          <a:solidFill>
+                            <a:schemeClr val="tx1"/>
+                          </a:solidFill>
+                          <a:latin typeface="Courier New" pitchFamily="49" charset="0"/>
+                        </a:rPr>
+                        <a:t> T * (I - 1)..T * I - 1 </a:t>
+                      </a:r>
+                      <a:r>
+                        <a:rPr lang="en-US" sz="1100" b="1" dirty="0" smtClean="0">
+                          <a:solidFill>
+                            <a:schemeClr val="tx1"/>
+                          </a:solidFill>
+                          <a:latin typeface="Courier New" pitchFamily="49" charset="0"/>
+                        </a:rPr>
+                        <a:t>loop</a:t>
+                      </a:r>
+                    </a:p>
+                    <a:p>
+                      <a:r>
+                        <a:rPr lang="en-US" sz="1100" b="0" dirty="0" smtClean="0">
+                          <a:solidFill>
+                            <a:schemeClr val="tx1"/>
+                          </a:solidFill>
+                          <a:latin typeface="Courier New" pitchFamily="49" charset="0"/>
+                        </a:rPr>
+                        <a:t>      S := S + 4.0 / (1.0 + </a:t>
+                      </a:r>
+                      <a:r>
+                        <a:rPr lang="en-US" sz="1100" b="0" i="1" dirty="0" smtClean="0">
+                          <a:solidFill>
+                            <a:schemeClr val="tx1"/>
+                          </a:solidFill>
+                          <a:latin typeface="Courier New" pitchFamily="49" charset="0"/>
+                        </a:rPr>
+                        <a:t>--</a:t>
+                      </a:r>
+                      <a:r>
+                        <a:rPr lang="en-US" sz="1100" b="0" i="1" baseline="0" dirty="0" smtClean="0">
+                          <a:solidFill>
+                            <a:schemeClr val="tx1"/>
+                          </a:solidFill>
+                          <a:latin typeface="Courier New" pitchFamily="49" charset="0"/>
+                        </a:rPr>
+                        <a:t> Use the rectangle rule to calculate PI</a:t>
+                      </a:r>
+                      <a:endParaRPr lang="en-US" sz="1100" b="0" dirty="0" smtClean="0">
+                        <a:solidFill>
+                          <a:schemeClr val="tx1"/>
+                        </a:solidFill>
+                        <a:latin typeface="Courier New" pitchFamily="49" charset="0"/>
+                      </a:endParaRPr>
+                    </a:p>
+                    <a:p>
+                      <a:r>
+                        <a:rPr lang="en-US" sz="1100" b="0" baseline="0" dirty="0" smtClean="0">
+                          <a:solidFill>
+                            <a:schemeClr val="tx1"/>
+                          </a:solidFill>
+                          <a:latin typeface="Courier New" pitchFamily="49" charset="0"/>
+                        </a:rPr>
+                        <a:t>         </a:t>
+                      </a:r>
+                      <a:r>
+                        <a:rPr lang="en-US" sz="1100" b="0" dirty="0" smtClean="0">
+                          <a:solidFill>
+                            <a:schemeClr val="tx1"/>
+                          </a:solidFill>
+                          <a:latin typeface="Courier New" pitchFamily="49" charset="0"/>
+                        </a:rPr>
+                        <a:t>(1.0 / </a:t>
+                      </a:r>
+                      <a:r>
+                        <a:rPr lang="en-US" sz="1100" b="0" dirty="0" err="1" smtClean="0">
+                          <a:solidFill>
+                            <a:schemeClr val="tx1"/>
+                          </a:solidFill>
+                          <a:latin typeface="Courier New" pitchFamily="49" charset="0"/>
+                        </a:rPr>
+                        <a:t>Long_Long_Float</a:t>
+                      </a:r>
+                      <a:r>
+                        <a:rPr lang="en-US" sz="1100" b="0" dirty="0" smtClean="0">
+                          <a:solidFill>
+                            <a:schemeClr val="tx1"/>
+                          </a:solidFill>
+                          <a:latin typeface="Courier New" pitchFamily="49" charset="0"/>
+                        </a:rPr>
+                        <a:t> (INTERVALS) * (</a:t>
+                      </a:r>
+                      <a:r>
+                        <a:rPr lang="en-US" sz="1100" b="0" dirty="0" err="1" smtClean="0">
+                          <a:solidFill>
+                            <a:schemeClr val="tx1"/>
+                          </a:solidFill>
+                          <a:latin typeface="Courier New" pitchFamily="49" charset="0"/>
+                        </a:rPr>
+                        <a:t>Long_Long_Float</a:t>
+                      </a:r>
+                      <a:r>
+                        <a:rPr lang="en-US" sz="1100" b="0" dirty="0" smtClean="0">
+                          <a:solidFill>
+                            <a:schemeClr val="tx1"/>
+                          </a:solidFill>
+                          <a:latin typeface="Courier New" pitchFamily="49" charset="0"/>
+                        </a:rPr>
+                        <a:t> (J) + 0.5))**2);</a:t>
+                      </a:r>
+                    </a:p>
+                    <a:p>
+                      <a:r>
+                        <a:rPr lang="en-US" sz="1100" b="1" dirty="0" smtClean="0">
+                          <a:solidFill>
+                            <a:schemeClr val="tx1"/>
+                          </a:solidFill>
+                          <a:latin typeface="Courier New" pitchFamily="49" charset="0"/>
+                        </a:rPr>
+                        <a:t>   end loop;</a:t>
+                      </a:r>
+                    </a:p>
+                    <a:p>
+                      <a:pPr marL="0" marR="0" indent="0" algn="l" defTabSz="914400" rtl="0" eaLnBrk="1" fontAlgn="auto" latinLnBrk="0" hangingPunct="1">
+                        <a:lnSpc>
+                          <a:spcPct val="100000"/>
+                        </a:lnSpc>
+                        <a:spcBef>
+                          <a:spcPts val="0"/>
+                        </a:spcBef>
+                        <a:spcAft>
+                          <a:spcPts val="0"/>
+                        </a:spcAft>
+                        <a:buClrTx/>
+                        <a:buSzTx/>
+                        <a:buFontTx/>
+                        <a:buNone/>
+                        <a:tabLst/>
+                        <a:defRPr/>
+                      </a:pPr>
+                      <a:r>
+                        <a:rPr lang="en-US" sz="1100" b="1" dirty="0" smtClean="0">
+                          <a:solidFill>
+                            <a:schemeClr val="tx1"/>
+                          </a:solidFill>
+                          <a:latin typeface="Courier New" pitchFamily="49" charset="0"/>
+                        </a:rPr>
+                        <a:t>   </a:t>
+                      </a:r>
+                      <a:r>
+                        <a:rPr lang="en-US" sz="1100" b="0" dirty="0" err="1" smtClean="0">
+                          <a:solidFill>
+                            <a:schemeClr val="tx1"/>
+                          </a:solidFill>
+                          <a:latin typeface="Courier New" pitchFamily="49" charset="0"/>
+                        </a:rPr>
+                        <a:t>Sum.Add</a:t>
+                      </a:r>
+                      <a:r>
+                        <a:rPr lang="en-US" sz="1100" b="0" dirty="0" smtClean="0">
+                          <a:solidFill>
+                            <a:schemeClr val="tx1"/>
+                          </a:solidFill>
+                          <a:latin typeface="Courier New" pitchFamily="49" charset="0"/>
+                        </a:rPr>
+                        <a:t> (S); </a:t>
+                      </a:r>
+                      <a:r>
+                        <a:rPr lang="en-US" sz="1100" b="0" i="1" dirty="0" smtClean="0">
+                          <a:solidFill>
+                            <a:schemeClr val="tx1"/>
+                          </a:solidFill>
+                          <a:latin typeface="Courier New" pitchFamily="49" charset="0"/>
+                        </a:rPr>
+                        <a:t>-- Return result</a:t>
+                      </a:r>
+                      <a:endParaRPr lang="en-US" sz="1100" b="0" dirty="0" smtClean="0">
+                        <a:solidFill>
+                          <a:schemeClr val="tx1"/>
+                        </a:solidFill>
+                        <a:latin typeface="Courier New" pitchFamily="49" charset="0"/>
+                      </a:endParaRPr>
+                    </a:p>
+                    <a:p>
+                      <a:r>
+                        <a:rPr lang="en-US" sz="1100" b="1" dirty="0" smtClean="0">
+                          <a:solidFill>
+                            <a:schemeClr val="tx1"/>
+                          </a:solidFill>
+                          <a:latin typeface="Courier New" pitchFamily="49" charset="0"/>
+                        </a:rPr>
+                        <a:t>end </a:t>
+                      </a:r>
+                      <a:r>
+                        <a:rPr lang="en-US" sz="1100" b="0" dirty="0" err="1" smtClean="0">
+                          <a:solidFill>
+                            <a:schemeClr val="tx1"/>
+                          </a:solidFill>
+                          <a:latin typeface="Courier New" pitchFamily="49" charset="0"/>
+                        </a:rPr>
+                        <a:t>PI_Process</a:t>
+                      </a:r>
+                      <a:r>
+                        <a:rPr lang="en-US" sz="1100" b="1" dirty="0" smtClean="0">
+                          <a:solidFill>
+                            <a:schemeClr val="tx1"/>
+                          </a:solidFill>
+                          <a:latin typeface="Courier New" pitchFamily="49" charset="0"/>
+                        </a:rPr>
+                        <a:t>;</a:t>
+                      </a:r>
+                    </a:p>
+                    <a:p>
+                      <a:r>
+                        <a:rPr lang="en-US" sz="1100" b="1" dirty="0" smtClean="0">
+                          <a:solidFill>
+                            <a:schemeClr val="tx1"/>
+                          </a:solidFill>
+                          <a:latin typeface="Courier New" pitchFamily="49" charset="0"/>
+                        </a:rPr>
+                        <a:t>…</a:t>
+                      </a:r>
+                      <a:endParaRPr lang="en-US" sz="1100" b="0" dirty="0" smtClean="0">
+                        <a:solidFill>
+                          <a:schemeClr val="tx1"/>
+                        </a:solidFill>
+                        <a:latin typeface="Courier New" pitchFamily="49" charset="0"/>
+                      </a:endParaRPr>
+                    </a:p>
+                  </a:txBody>
+                  <a:tcPr marL="91421" marR="91421" marT="45583" marB="45583">
+                    <a:solidFill>
+                      <a:schemeClr val="bg1">
+                        <a:lumMod val="95000"/>
+                      </a:schemeClr>
+                    </a:solidFill>
+                  </a:tcPr>
+                </a:tc>
+              </a:tr>
+            </a:tbl>
+          </a:graphicData>
+        </a:graphic>
+      </p:graphicFrame>
+    </p:spTree>
+    <p:extLst>
+      <p:ext uri="{BB962C8B-B14F-4D97-AF65-F5344CB8AC3E}">
+        <p14:creationId xmlns:p14="http://schemas.microsoft.com/office/powerpoint/2010/main" val="1550422202"/>
+      </p:ext>
+    </p:extLst>
+  </p:cSld>
+  <p:clrMapOvr>
+    <a:masterClrMapping/>
+  </p:clrMapOvr>
+</p:sld>
+</file>
+
+<file path=ppt/slides/slide7.xml><?xml version="1.0" encoding="utf-8"?>
+<p:sld xmlns:a="http://schemas.openxmlformats.org/drawingml/2006/main" xmlns:r="http://schemas.openxmlformats.org/officeDocument/2006/relationships" xmlns:p="http://schemas.openxmlformats.org/presentationml/2006/main">
+  <p:cSld>
+    <p:spTree>
+      <p:nvGrpSpPr>
+        <p:cNvPr id="1" name=""/>
+        <p:cNvGrpSpPr/>
+        <p:nvPr/>
+      </p:nvGrpSpPr>
+      <p:grpSpPr>
+        <a:xfrm>
+          <a:off x="0" y="0"/>
+          <a:ext cx="0" cy="0"/>
+          <a:chOff x="0" y="0"/>
+          <a:chExt cx="0" cy="0"/>
+        </a:xfrm>
+      </p:grpSpPr>
+      <p:sp>
+        <p:nvSpPr>
+          <p:cNvPr id="3" name="Title 2"/>
+          <p:cNvSpPr>
+            <a:spLocks noGrp="1"/>
+          </p:cNvSpPr>
+          <p:nvPr>
+            <p:ph type="title"/>
+          </p:nvPr>
+        </p:nvSpPr>
+        <p:spPr/>
+        <p:txBody>
+          <a:bodyPr/>
+          <a:lstStyle/>
+          <a:p>
+            <a:r>
+              <a:rPr lang="en-GB" b="1" dirty="0" smtClean="0"/>
+              <a:t>Result of </a:t>
+            </a:r>
+            <a:r>
+              <a:rPr lang="en-GB" b="1" dirty="0" err="1" smtClean="0"/>
+              <a:t>Time_PI</a:t>
+            </a:r>
+            <a:endParaRPr lang="en-GB" b="1" dirty="0"/>
+          </a:p>
+        </p:txBody>
+      </p:sp>
+      <p:sp>
+        <p:nvSpPr>
+          <p:cNvPr id="4" name="Content Placeholder 3"/>
+          <p:cNvSpPr>
+            <a:spLocks noGrp="1"/>
+          </p:cNvSpPr>
+          <p:nvPr>
+            <p:ph sz="half" idx="10"/>
+          </p:nvPr>
+        </p:nvSpPr>
+        <p:spPr>
+          <a:xfrm>
+            <a:off x="685800" y="1143001"/>
+            <a:ext cx="7848600" cy="974968"/>
+          </a:xfrm>
+        </p:spPr>
+        <p:txBody>
+          <a:bodyPr/>
+          <a:lstStyle/>
+          <a:p>
+            <a:r>
+              <a:rPr lang="en-GB" dirty="0" smtClean="0"/>
+              <a:t>…</a:t>
+            </a:r>
+            <a:endParaRPr lang="en-GB" dirty="0"/>
+          </a:p>
+        </p:txBody>
+      </p:sp>
+      <p:graphicFrame>
+        <p:nvGraphicFramePr>
+          <p:cNvPr id="5" name="Tableau 5"/>
+          <p:cNvGraphicFramePr>
+            <a:graphicFrameLocks noGrp="1"/>
+          </p:cNvGraphicFramePr>
+          <p:nvPr>
+            <p:extLst>
+              <p:ext uri="{D42A27DB-BD31-4B8C-83A1-F6EECF244321}">
+                <p14:modId xmlns:p14="http://schemas.microsoft.com/office/powerpoint/2010/main" val="982804829"/>
+              </p:ext>
+            </p:extLst>
+          </p:nvPr>
+        </p:nvGraphicFramePr>
+        <p:xfrm>
+          <a:off x="862666" y="2122475"/>
+          <a:ext cx="7293625" cy="2270486"/>
+        </p:xfrm>
+        <a:graphic>
+          <a:graphicData uri="http://schemas.openxmlformats.org/drawingml/2006/table">
+            <a:tbl>
+              <a:tblPr firstRow="1" bandRow="1">
+                <a:tableStyleId>{5C22544A-7EE6-4342-B048-85BDC9FD1C3A}</a:tableStyleId>
+              </a:tblPr>
+              <a:tblGrid>
+                <a:gridCol w="7293625"/>
+              </a:tblGrid>
+              <a:tr h="2121279">
+                <a:tc>
+                  <a:txBody>
+                    <a:bodyPr/>
+                    <a:lstStyle/>
+                    <a:p>
+                      <a:r>
+                        <a:rPr lang="en-US" sz="1100" b="0" dirty="0" smtClean="0">
+                          <a:solidFill>
+                            <a:schemeClr val="tx1"/>
+                          </a:solidFill>
+                          <a:latin typeface="Courier New" pitchFamily="49" charset="0"/>
+                        </a:rPr>
+                        <a:t>Rectangle rule PI calculator with 10000000 intervals</a:t>
+                      </a:r>
+                    </a:p>
+                    <a:p>
+                      <a:r>
+                        <a:rPr lang="en-US" sz="1100" b="0" dirty="0" smtClean="0">
+                          <a:solidFill>
+                            <a:schemeClr val="tx1"/>
+                          </a:solidFill>
+                          <a:latin typeface="Courier New" pitchFamily="49" charset="0"/>
+                        </a:rPr>
+                        <a:t>1 CPU(s):</a:t>
+                      </a:r>
+                    </a:p>
+                    <a:p>
+                      <a:r>
+                        <a:rPr lang="en-US" sz="1100" b="0" dirty="0" smtClean="0">
+                          <a:solidFill>
+                            <a:schemeClr val="tx1"/>
+                          </a:solidFill>
+                          <a:latin typeface="Courier New" pitchFamily="49" charset="0"/>
+                        </a:rPr>
+                        <a:t>  </a:t>
+                      </a:r>
+                      <a:r>
+                        <a:rPr lang="en-US" sz="1100" b="0" i="0" dirty="0" smtClean="0">
+                          <a:solidFill>
+                            <a:schemeClr val="tx1"/>
+                          </a:solidFill>
+                          <a:latin typeface="Courier New" pitchFamily="49" charset="0"/>
+                        </a:rPr>
+                        <a:t>Elapsed</a:t>
+                      </a:r>
+                      <a:r>
+                        <a:rPr lang="en-US" sz="1100" b="0" dirty="0" smtClean="0">
+                          <a:solidFill>
+                            <a:schemeClr val="tx1"/>
+                          </a:solidFill>
+                          <a:latin typeface="Courier New" pitchFamily="49" charset="0"/>
+                        </a:rPr>
+                        <a:t> 0.243275167 seconds</a:t>
+                      </a:r>
+                    </a:p>
+                    <a:p>
+                      <a:r>
+                        <a:rPr lang="en-US" sz="1100" b="0" dirty="0" smtClean="0">
+                          <a:solidFill>
+                            <a:schemeClr val="tx1"/>
+                          </a:solidFill>
+                          <a:latin typeface="Courier New" pitchFamily="49" charset="0"/>
+                        </a:rPr>
+                        <a:t>  Result 3.14159265358979382E+00</a:t>
+                      </a:r>
+                    </a:p>
+                    <a:p>
+                      <a:r>
+                        <a:rPr lang="en-US" sz="1100" b="0" dirty="0" smtClean="0">
+                          <a:solidFill>
+                            <a:schemeClr val="tx1"/>
+                          </a:solidFill>
+                          <a:latin typeface="Courier New" pitchFamily="49" charset="0"/>
+                        </a:rPr>
+                        <a:t>2 CPU(s):</a:t>
+                      </a:r>
+                    </a:p>
+                    <a:p>
+                      <a:r>
+                        <a:rPr lang="en-US" sz="1100" b="0" dirty="0" smtClean="0">
+                          <a:solidFill>
+                            <a:schemeClr val="tx1"/>
+                          </a:solidFill>
+                          <a:latin typeface="Courier New" pitchFamily="49" charset="0"/>
+                        </a:rPr>
+                        <a:t>  </a:t>
+                      </a:r>
+                      <a:r>
+                        <a:rPr lang="en-US" sz="1100" b="0" i="0" dirty="0" smtClean="0">
+                          <a:solidFill>
+                            <a:schemeClr val="tx1"/>
+                          </a:solidFill>
+                          <a:latin typeface="Courier New" pitchFamily="49" charset="0"/>
+                        </a:rPr>
+                        <a:t>Elapsed </a:t>
+                      </a:r>
+                      <a:r>
+                        <a:rPr lang="en-US" sz="1100" b="0" dirty="0" smtClean="0">
+                          <a:solidFill>
+                            <a:schemeClr val="tx1"/>
+                          </a:solidFill>
+                          <a:latin typeface="Courier New" pitchFamily="49" charset="0"/>
+                        </a:rPr>
+                        <a:t>0.122008821 seconds</a:t>
+                      </a:r>
+                    </a:p>
+                    <a:p>
+                      <a:r>
+                        <a:rPr lang="en-US" sz="1100" b="0" dirty="0" smtClean="0">
+                          <a:solidFill>
+                            <a:schemeClr val="tx1"/>
+                          </a:solidFill>
+                          <a:latin typeface="Courier New" pitchFamily="49" charset="0"/>
+                        </a:rPr>
+                        <a:t>  Result 3.14159265358979417E+00</a:t>
+                      </a:r>
+                    </a:p>
+                    <a:p>
+                      <a:r>
+                        <a:rPr lang="en-US" sz="1100" b="0" dirty="0" smtClean="0">
+                          <a:solidFill>
+                            <a:schemeClr val="tx1"/>
+                          </a:solidFill>
+                          <a:latin typeface="Courier New" pitchFamily="49" charset="0"/>
+                        </a:rPr>
+                        <a:t>3 CPU(s):</a:t>
+                      </a:r>
+                    </a:p>
+                    <a:p>
+                      <a:r>
+                        <a:rPr lang="en-US" sz="1100" b="0" dirty="0" smtClean="0">
+                          <a:solidFill>
+                            <a:schemeClr val="tx1"/>
+                          </a:solidFill>
+                          <a:latin typeface="Courier New" pitchFamily="49" charset="0"/>
+                        </a:rPr>
+                        <a:t>  </a:t>
+                      </a:r>
+                      <a:r>
+                        <a:rPr lang="en-US" sz="1100" b="0" i="0" dirty="0" smtClean="0">
+                          <a:solidFill>
+                            <a:schemeClr val="tx1"/>
+                          </a:solidFill>
+                          <a:latin typeface="Courier New" pitchFamily="49" charset="0"/>
+                        </a:rPr>
+                        <a:t>Elapsed</a:t>
+                      </a:r>
+                      <a:r>
+                        <a:rPr lang="en-US" sz="1100" b="0" dirty="0" smtClean="0">
+                          <a:solidFill>
+                            <a:schemeClr val="tx1"/>
+                          </a:solidFill>
+                          <a:latin typeface="Courier New" pitchFamily="49" charset="0"/>
+                        </a:rPr>
+                        <a:t> 0.082370523 seconds</a:t>
+                      </a:r>
+                    </a:p>
+                    <a:p>
+                      <a:r>
+                        <a:rPr lang="en-US" sz="1100" b="0" dirty="0" smtClean="0">
+                          <a:solidFill>
+                            <a:schemeClr val="tx1"/>
+                          </a:solidFill>
+                          <a:latin typeface="Courier New" pitchFamily="49" charset="0"/>
+                        </a:rPr>
+                        <a:t>  Result 3.14159245358978408E+00</a:t>
+                      </a:r>
+                    </a:p>
+                    <a:p>
+                      <a:r>
+                        <a:rPr lang="en-US" sz="1100" b="0" dirty="0" smtClean="0">
+                          <a:solidFill>
+                            <a:schemeClr val="tx1"/>
+                          </a:solidFill>
+                          <a:latin typeface="Courier New" pitchFamily="49" charset="0"/>
+                        </a:rPr>
+                        <a:t>4 CPU(s):</a:t>
+                      </a:r>
+                    </a:p>
+                    <a:p>
+                      <a:r>
+                        <a:rPr lang="en-US" sz="1100" b="0" dirty="0" smtClean="0">
+                          <a:solidFill>
+                            <a:schemeClr val="tx1"/>
+                          </a:solidFill>
+                          <a:latin typeface="Courier New" pitchFamily="49" charset="0"/>
+                        </a:rPr>
+                        <a:t>  </a:t>
+                      </a:r>
+                      <a:r>
+                        <a:rPr lang="en-US" sz="1100" b="0" i="0" dirty="0" smtClean="0">
+                          <a:solidFill>
+                            <a:schemeClr val="tx1"/>
+                          </a:solidFill>
+                          <a:latin typeface="Courier New" pitchFamily="49" charset="0"/>
+                        </a:rPr>
+                        <a:t>Elapsed</a:t>
+                      </a:r>
+                      <a:r>
+                        <a:rPr lang="en-US" sz="1100" b="0" dirty="0" smtClean="0">
+                          <a:solidFill>
+                            <a:schemeClr val="tx1"/>
+                          </a:solidFill>
+                          <a:latin typeface="Courier New" pitchFamily="49" charset="0"/>
+                        </a:rPr>
+                        <a:t> 0.063102199 seconds</a:t>
+                      </a:r>
+                    </a:p>
+                    <a:p>
+                      <a:r>
+                        <a:rPr lang="en-US" sz="1100" b="0" dirty="0" smtClean="0">
+                          <a:solidFill>
+                            <a:schemeClr val="tx1"/>
+                          </a:solidFill>
+                          <a:latin typeface="Courier New" pitchFamily="49" charset="0"/>
+                        </a:rPr>
+                        <a:t>  With the resulting PI of 3.14159265358979408E+</a:t>
+                      </a:r>
+                    </a:p>
+                  </a:txBody>
+                  <a:tcPr marL="91421" marR="91421" marT="45583" marB="45583">
+                    <a:solidFill>
+                      <a:schemeClr val="bg1">
+                        <a:lumMod val="95000"/>
+                      </a:schemeClr>
+                    </a:solidFill>
+                  </a:tcPr>
+                </a:tc>
+              </a:tr>
+            </a:tbl>
+          </a:graphicData>
+        </a:graphic>
+      </p:graphicFrame>
+    </p:spTree>
+    <p:extLst>
+      <p:ext uri="{BB962C8B-B14F-4D97-AF65-F5344CB8AC3E}">
+        <p14:creationId xmlns:p14="http://schemas.microsoft.com/office/powerpoint/2010/main" val="1359948957"/>
+      </p:ext>
+    </p:extLst>
+  </p:cSld>
+  <p:clrMapOvr>
+    <a:masterClrMapping/>
+  </p:clrMapOvr>
+</p:sld>
+</file>
+
+<file path=ppt/slides/slide8.xml><?xml version="1.0" encoding="utf-8"?>
+<p:sld xmlns:a="http://schemas.openxmlformats.org/drawingml/2006/main" xmlns:r="http://schemas.openxmlformats.org/officeDocument/2006/relationships" xmlns:p="http://schemas.openxmlformats.org/presentationml/2006/main">
+  <p:cSld>
+    <p:spTree>
+      <p:nvGrpSpPr>
+        <p:cNvPr id="1" name=""/>
+        <p:cNvGrpSpPr/>
+        <p:nvPr/>
+      </p:nvGrpSpPr>
+      <p:grpSpPr>
+        <a:xfrm>
+          <a:off x="0" y="0"/>
+          <a:ext cx="0" cy="0"/>
+          <a:chOff x="0" y="0"/>
+          <a:chExt cx="0" cy="0"/>
+        </a:xfrm>
+      </p:grpSpPr>
+    </p:spTree>
+    <p:extLst>
+      <p:ext uri="{BB962C8B-B14F-4D97-AF65-F5344CB8AC3E}">
+        <p14:creationId xmlns:p14="http://schemas.microsoft.com/office/powerpoint/2010/main" val="396922585"/>
+      </p:ext>
+    </p:extLst>
+  </p:cSld>
+  <p:clrMapOvr>
+    <a:masterClrMapping/>
+  </p:clrMapOvr>
+</p:sld>
+</file>
+
+<file path=ppt/slides/slide9.xml><?xml version="1.0" encoding="utf-8"?>
+<p:sld xmlns:a="http://schemas.openxmlformats.org/drawingml/2006/main" xmlns:r="http://schemas.openxmlformats.org/officeDocument/2006/relationships" xmlns:p="http://schemas.openxmlformats.org/presentationml/2006/main">
+  <p:cSld>
+    <p:spTree>
+      <p:nvGrpSpPr>
+        <p:cNvPr id="1" name=""/>
+        <p:cNvGrpSpPr/>
+        <p:nvPr/>
+      </p:nvGrpSpPr>
+      <p:grpSpPr>
+        <a:xfrm>
+          <a:off x="0" y="0"/>
+          <a:ext cx="0" cy="0"/>
+          <a:chOff x="0" y="0"/>
+          <a:chExt cx="0" cy="0"/>
+        </a:xfrm>
+      </p:grpSpPr>
+    </p:spTree>
+    <p:extLst>
+      <p:ext uri="{BB962C8B-B14F-4D97-AF65-F5344CB8AC3E}">
+        <p14:creationId xmlns:p14="http://schemas.microsoft.com/office/powerpoint/2010/main" val="1688865195"/>
       </p:ext>
     </p:extLst>
   </p:cSld>

</xml_diff>